<commit_message>
! updated & completed.
</commit_message>
<xml_diff>
--- a/lessions/Android_Par07_Networking.pptx
+++ b/lessions/Android_Par07_Networking.pptx
@@ -5,10 +5,10 @@
     <p:sldMasterId id="2147483653" r:id="rId1"/>
   </p:sldMasterIdLst>
   <p:notesMasterIdLst>
-    <p:notesMasterId r:id="rId12"/>
+    <p:notesMasterId r:id="rId18"/>
   </p:notesMasterIdLst>
   <p:handoutMasterIdLst>
-    <p:handoutMasterId r:id="rId13"/>
+    <p:handoutMasterId r:id="rId19"/>
   </p:handoutMasterIdLst>
   <p:sldIdLst>
     <p:sldId id="256" r:id="rId2"/>
@@ -19,8 +19,14 @@
     <p:sldId id="303" r:id="rId7"/>
     <p:sldId id="304" r:id="rId8"/>
     <p:sldId id="305" r:id="rId9"/>
-    <p:sldId id="306" r:id="rId10"/>
-    <p:sldId id="258" r:id="rId11"/>
+    <p:sldId id="308" r:id="rId10"/>
+    <p:sldId id="313" r:id="rId11"/>
+    <p:sldId id="309" r:id="rId12"/>
+    <p:sldId id="314" r:id="rId13"/>
+    <p:sldId id="315" r:id="rId14"/>
+    <p:sldId id="310" r:id="rId15"/>
+    <p:sldId id="311" r:id="rId16"/>
+    <p:sldId id="258" r:id="rId17"/>
   </p:sldIdLst>
   <p:sldSz cx="9144000" cy="6858000" type="screen4x3"/>
   <p:notesSz cx="6858000" cy="9144000"/>
@@ -357,7 +363,7 @@
             <a:pPr>
               <a:defRPr/>
             </a:pPr>
-            <a:fld id="{5A4ED0E2-6136-4A5D-B101-2642AACC782A}" type="slidenum">
+            <a:fld id="{D7DB6374-5A6B-4574-8118-6A60F1B3303D}" type="slidenum">
               <a:rPr lang="en-US"/>
               <a:pPr>
                 <a:defRPr/>
@@ -679,7 +685,7 @@
             <a:pPr>
               <a:defRPr/>
             </a:pPr>
-            <a:fld id="{A3C2B217-8D00-4589-AB4E-604F9F81DA40}" type="slidenum">
+            <a:fld id="{988F9CA1-F361-4199-8901-7F020CC12725}" type="slidenum">
               <a:rPr lang="en-US"/>
               <a:pPr>
                 <a:defRPr/>
@@ -852,7 +858,7 @@
           <a:bodyPr/>
           <a:lstStyle/>
           <a:p>
-            <a:fld id="{4218E07C-8A6E-45B1-A594-E135297E2A3B}" type="slidenum">
+            <a:fld id="{C4996599-750A-403C-803C-26BBC984D90A}" type="slidenum">
               <a:rPr lang="en-US" smtClean="0"/>
               <a:pPr/>
               <a:t>1</a:t>
@@ -1225,12 +1231,12 @@
             <a:pPr>
               <a:defRPr/>
             </a:pPr>
-            <a:fld id="{A1E00ED0-8D16-4D77-B77F-067A1F3490C3}" type="datetime1">
+            <a:fld id="{B4FE9DE2-D2EE-4E1D-8567-BCA6188AF9BA}" type="datetime1">
               <a:rPr lang="vi-VN"/>
               <a:pPr>
                 <a:defRPr/>
               </a:pPr>
-              <a:t>02/11/2011</a:t>
+              <a:t>04/11/2011</a:t>
             </a:fld>
             <a:endParaRPr lang="en-US"/>
           </a:p>
@@ -1393,12 +1399,12 @@
             <a:pPr>
               <a:defRPr/>
             </a:pPr>
-            <a:fld id="{6CE937EA-083A-4D7C-B8DB-08BE6E192D34}" type="datetime1">
+            <a:fld id="{ED6CE428-A970-4FB5-9978-15FCC0173ED9}" type="datetime1">
               <a:rPr lang="vi-VN"/>
               <a:pPr>
                 <a:defRPr/>
               </a:pPr>
-              <a:t>02/11/2011</a:t>
+              <a:t>04/11/2011</a:t>
             </a:fld>
             <a:endParaRPr lang="en-US"/>
           </a:p>
@@ -1459,7 +1465,7 @@
             <a:pPr>
               <a:defRPr/>
             </a:pPr>
-            <a:fld id="{E850A642-0F19-4ABD-9D4D-85F3A44072F5}" type="slidenum">
+            <a:fld id="{31794066-C539-448B-BA79-958CFAEA93F5}" type="slidenum">
               <a:rPr lang="en-US"/>
               <a:pPr>
                 <a:defRPr/>
@@ -1604,12 +1610,12 @@
             <a:pPr>
               <a:defRPr/>
             </a:pPr>
-            <a:fld id="{595B88AB-F40A-4280-B575-ECA6FB993FAC}" type="datetime1">
+            <a:fld id="{5A6ADC1D-ABF6-455A-8CF1-33DDFCF0D31C}" type="datetime1">
               <a:rPr lang="vi-VN"/>
               <a:pPr>
                 <a:defRPr/>
               </a:pPr>
-              <a:t>02/11/2011</a:t>
+              <a:t>04/11/2011</a:t>
             </a:fld>
             <a:endParaRPr lang="en-US"/>
           </a:p>
@@ -1670,7 +1676,7 @@
             <a:pPr>
               <a:defRPr/>
             </a:pPr>
-            <a:fld id="{E90BA8CF-EC9C-4EE9-AA49-52A17EE4BD43}" type="slidenum">
+            <a:fld id="{2311847E-B2F3-400E-A1A1-41347539F0E0}" type="slidenum">
               <a:rPr lang="en-US"/>
               <a:pPr>
                 <a:defRPr/>
@@ -1805,12 +1811,12 @@
             <a:pPr>
               <a:defRPr/>
             </a:pPr>
-            <a:fld id="{6107CEAD-B945-4410-9056-A3B2F3A049FB}" type="datetime1">
+            <a:fld id="{AFAA942A-574B-4412-8F69-AC174CAB8FAE}" type="datetime1">
               <a:rPr lang="vi-VN"/>
               <a:pPr>
                 <a:defRPr/>
               </a:pPr>
-              <a:t>02/11/2011</a:t>
+              <a:t>04/11/2011</a:t>
             </a:fld>
             <a:endParaRPr lang="en-US"/>
           </a:p>
@@ -1871,7 +1877,7 @@
             <a:pPr>
               <a:defRPr/>
             </a:pPr>
-            <a:fld id="{DF598EEF-12AE-4796-AB84-083E1E6C722C}" type="slidenum">
+            <a:fld id="{66254565-1A44-418A-9269-7D25D716F447}" type="slidenum">
               <a:rPr lang="en-US"/>
               <a:pPr>
                 <a:defRPr/>
@@ -2028,12 +2034,12 @@
             <a:pPr>
               <a:defRPr/>
             </a:pPr>
-            <a:fld id="{C7D13525-FD71-4AF1-9D81-15F8818EA73D}" type="datetime1">
+            <a:fld id="{62C1C254-3D54-44D5-8D14-BEF50074B1C1}" type="datetime1">
               <a:rPr lang="vi-VN"/>
               <a:pPr>
                 <a:defRPr/>
               </a:pPr>
-              <a:t>02/11/2011</a:t>
+              <a:t>04/11/2011</a:t>
             </a:fld>
             <a:endParaRPr lang="en-US"/>
           </a:p>
@@ -2094,7 +2100,7 @@
             <a:pPr>
               <a:defRPr/>
             </a:pPr>
-            <a:fld id="{1244A1B5-1E49-4307-BC21-9F6BEA0C5C3E}" type="slidenum">
+            <a:fld id="{430FA1C5-E8CF-4026-980A-785C36604D51}" type="slidenum">
               <a:rPr lang="en-US"/>
               <a:pPr>
                 <a:defRPr/>
@@ -2347,12 +2353,12 @@
             <a:pPr>
               <a:defRPr/>
             </a:pPr>
-            <a:fld id="{40B964B0-2422-4F38-A5D8-DFEF5C4CCB70}" type="datetime1">
+            <a:fld id="{05638F57-9A24-449B-9890-0BFB74469F7F}" type="datetime1">
               <a:rPr lang="vi-VN"/>
               <a:pPr>
                 <a:defRPr/>
               </a:pPr>
-              <a:t>02/11/2011</a:t>
+              <a:t>04/11/2011</a:t>
             </a:fld>
             <a:endParaRPr lang="en-US"/>
           </a:p>
@@ -2413,7 +2419,7 @@
             <a:pPr>
               <a:defRPr/>
             </a:pPr>
-            <a:fld id="{D25A442A-E7E4-46DC-B047-9F9611E09B1B}" type="slidenum">
+            <a:fld id="{7D6DEA73-715C-42E8-9D41-CCB7B8EAA0E9}" type="slidenum">
               <a:rPr lang="en-US"/>
               <a:pPr>
                 <a:defRPr/>
@@ -2805,12 +2811,12 @@
             <a:pPr>
               <a:defRPr/>
             </a:pPr>
-            <a:fld id="{86A8C1B1-1D16-4AF3-827E-6034BFC400F2}" type="datetime1">
+            <a:fld id="{96CE4ABC-552B-486F-9697-56C4264CF63F}" type="datetime1">
               <a:rPr lang="vi-VN"/>
               <a:pPr>
                 <a:defRPr/>
               </a:pPr>
-              <a:t>02/11/2011</a:t>
+              <a:t>04/11/2011</a:t>
             </a:fld>
             <a:endParaRPr lang="en-US"/>
           </a:p>
@@ -2871,7 +2877,7 @@
             <a:pPr>
               <a:defRPr/>
             </a:pPr>
-            <a:fld id="{6136D80E-C645-44A7-8E69-8D536F347D57}" type="slidenum">
+            <a:fld id="{15C2AFAF-071F-42F9-A057-DBC0870769C6}" type="slidenum">
               <a:rPr lang="en-US"/>
               <a:pPr>
                 <a:defRPr/>
@@ -2954,12 +2960,12 @@
             <a:pPr>
               <a:defRPr/>
             </a:pPr>
-            <a:fld id="{EDAE23E0-528C-4423-A3D2-D95210121A54}" type="datetime1">
+            <a:fld id="{6B92203F-F7B2-493C-80E5-8B95F030655B}" type="datetime1">
               <a:rPr lang="vi-VN"/>
               <a:pPr>
                 <a:defRPr/>
               </a:pPr>
-              <a:t>02/11/2011</a:t>
+              <a:t>04/11/2011</a:t>
             </a:fld>
             <a:endParaRPr lang="en-US"/>
           </a:p>
@@ -3020,7 +3026,7 @@
             <a:pPr>
               <a:defRPr/>
             </a:pPr>
-            <a:fld id="{875FC0EF-4775-4E20-AFE0-EAE38B20E9FE}" type="slidenum">
+            <a:fld id="{9769BA00-3866-4353-82E8-FEFAA96335C4}" type="slidenum">
               <a:rPr lang="en-US"/>
               <a:pPr>
                 <a:defRPr/>
@@ -3080,12 +3086,12 @@
             <a:pPr>
               <a:defRPr/>
             </a:pPr>
-            <a:fld id="{45272F4B-2882-41DA-B5FA-50161CE5A0BC}" type="datetime1">
+            <a:fld id="{BD04D499-AB50-4A58-8BAC-659BB9EC4B5C}" type="datetime1">
               <a:rPr lang="vi-VN"/>
               <a:pPr>
                 <a:defRPr/>
               </a:pPr>
-              <a:t>02/11/2011</a:t>
+              <a:t>04/11/2011</a:t>
             </a:fld>
             <a:endParaRPr lang="en-US"/>
           </a:p>
@@ -3146,7 +3152,7 @@
             <a:pPr>
               <a:defRPr/>
             </a:pPr>
-            <a:fld id="{78069B26-3568-459D-B8E2-CDE9FBF8BC11}" type="slidenum">
+            <a:fld id="{B4EA352D-A16B-4AE6-BD63-5C4E1EBED6DB}" type="slidenum">
               <a:rPr lang="en-US"/>
               <a:pPr>
                 <a:defRPr/>
@@ -3388,12 +3394,12 @@
             <a:pPr>
               <a:defRPr/>
             </a:pPr>
-            <a:fld id="{30BC65FA-A061-4F51-9BDE-7FA1E7BDCFD0}" type="datetime1">
+            <a:fld id="{090E5201-B273-4CAB-A342-C18E74A9944F}" type="datetime1">
               <a:rPr lang="vi-VN"/>
               <a:pPr>
                 <a:defRPr/>
               </a:pPr>
-              <a:t>02/11/2011</a:t>
+              <a:t>04/11/2011</a:t>
             </a:fld>
             <a:endParaRPr lang="en-US"/>
           </a:p>
@@ -3454,7 +3460,7 @@
             <a:pPr>
               <a:defRPr/>
             </a:pPr>
-            <a:fld id="{86C5223A-3A08-4AF3-9633-1D162DA4AE3B}" type="slidenum">
+            <a:fld id="{9A6AF7DD-862C-4FEC-9ED5-8E3E699570AF}" type="slidenum">
               <a:rPr lang="en-US"/>
               <a:pPr>
                 <a:defRPr/>
@@ -3673,12 +3679,12 @@
             <a:pPr>
               <a:defRPr/>
             </a:pPr>
-            <a:fld id="{8248F42A-197F-4E41-B4AB-6E1B0482144A}" type="datetime1">
+            <a:fld id="{3708FCF2-DA88-43F5-9CF3-D8A942189151}" type="datetime1">
               <a:rPr lang="vi-VN"/>
               <a:pPr>
                 <a:defRPr/>
               </a:pPr>
-              <a:t>02/11/2011</a:t>
+              <a:t>04/11/2011</a:t>
             </a:fld>
             <a:endParaRPr lang="en-US"/>
           </a:p>
@@ -3739,7 +3745,7 @@
             <a:pPr>
               <a:defRPr/>
             </a:pPr>
-            <a:fld id="{F0B1B122-A673-4920-A24B-3C19505B2CDF}" type="slidenum">
+            <a:fld id="{925A2768-DBFA-45CB-B9B8-7F7B68E5908E}" type="slidenum">
               <a:rPr lang="en-US"/>
               <a:pPr>
                 <a:defRPr/>
@@ -4239,12 +4245,12 @@
             <a:pPr>
               <a:defRPr/>
             </a:pPr>
-            <a:fld id="{E82454A3-C7A4-4B7B-AA8B-462524A47A9C}" type="datetime1">
+            <a:fld id="{29BE90BE-7C08-4956-B40B-C55235DFA9D3}" type="datetime1">
               <a:rPr lang="vi-VN"/>
               <a:pPr>
                 <a:defRPr/>
               </a:pPr>
-              <a:t>02/11/2011</a:t>
+              <a:t>04/11/2011</a:t>
             </a:fld>
             <a:endParaRPr lang="en-US"/>
           </a:p>
@@ -4349,7 +4355,7 @@
             <a:pPr>
               <a:defRPr/>
             </a:pPr>
-            <a:fld id="{04E3EEEF-77C5-4CF5-899C-273F95F46445}" type="slidenum">
+            <a:fld id="{F2410C56-9687-4AB2-B6D0-E484CE484EE0}" type="slidenum">
               <a:rPr lang="en-US"/>
               <a:pPr>
                 <a:defRPr/>
@@ -4851,7 +4857,7 @@
       </p:grpSpPr>
       <p:sp>
         <p:nvSpPr>
-          <p:cNvPr id="15363" name="Rectangle 11"/>
+          <p:cNvPr id="15361" name="Rectangle 11"/>
           <p:cNvSpPr>
             <a:spLocks noGrp="1" noChangeArrowheads="1"/>
           </p:cNvSpPr>
@@ -4870,7 +4876,7 @@
           <a:bodyPr/>
           <a:lstStyle/>
           <a:p>
-            <a:fld id="{640F2223-03A1-4919-AD85-65239D866EFD}" type="slidenum">
+            <a:fld id="{9AEABDBF-0E7E-448D-8732-64A28F703DC4}" type="slidenum">
               <a:rPr lang="en-US" smtClean="0"/>
               <a:pPr/>
               <a:t>1</a:t>
@@ -4881,7 +4887,7 @@
       </p:sp>
       <p:sp>
         <p:nvSpPr>
-          <p:cNvPr id="15364" name="AutoShape 2"/>
+          <p:cNvPr id="15362" name="AutoShape 2"/>
           <p:cNvSpPr>
             <a:spLocks noGrp="1" noChangeArrowheads="1"/>
           </p:cNvSpPr>
@@ -4919,7 +4925,7 @@
       </p:sp>
       <p:sp>
         <p:nvSpPr>
-          <p:cNvPr id="15365" name="Rectangle 3"/>
+          <p:cNvPr id="15363" name="Rectangle 3"/>
           <p:cNvSpPr>
             <a:spLocks noGrp="1" noChangeArrowheads="1"/>
           </p:cNvSpPr>
@@ -4942,7 +4948,7 @@
       </p:sp>
       <p:pic>
         <p:nvPicPr>
-          <p:cNvPr id="15366" name="Picture 4"/>
+          <p:cNvPr id="15364" name="Picture 4"/>
           <p:cNvPicPr>
             <a:picLocks noChangeAspect="1" noChangeArrowheads="1"/>
           </p:cNvPicPr>
@@ -4974,7 +4980,7 @@
       </p:pic>
       <p:sp>
         <p:nvSpPr>
-          <p:cNvPr id="15367" name="Rectangle 7"/>
+          <p:cNvPr id="15365" name="Rectangle 7"/>
           <p:cNvSpPr>
             <a:spLocks noChangeArrowheads="1"/>
           </p:cNvSpPr>
@@ -5043,7 +5049,1285 @@
       </p:grpSpPr>
       <p:sp>
         <p:nvSpPr>
-          <p:cNvPr id="38913" name="Date Placeholder 3"/>
+          <p:cNvPr id="32770" name="AutoShape 2"/>
+          <p:cNvSpPr>
+            <a:spLocks noGrp="1" noChangeArrowheads="1"/>
+          </p:cNvSpPr>
+          <p:nvPr>
+            <p:ph type="title"/>
+          </p:nvPr>
+        </p:nvSpPr>
+        <p:spPr>
+          <a:xfrm>
+            <a:off x="762000" y="762000"/>
+            <a:ext cx="7924800" cy="685800"/>
+          </a:xfrm>
+        </p:spPr>
+        <p:txBody>
+          <a:bodyPr/>
+          <a:lstStyle/>
+          <a:p>
+            <a:pPr algn="r"/>
+            <a:r>
+              <a:rPr lang="en-US" smtClean="0"/>
+              <a:t>Thao tác với cấu trúc XML</a:t>
+            </a:r>
+          </a:p>
+        </p:txBody>
+      </p:sp>
+      <p:sp>
+        <p:nvSpPr>
+          <p:cNvPr id="32771" name="Rectangle 3"/>
+          <p:cNvSpPr>
+            <a:spLocks noGrp="1" noChangeArrowheads="1"/>
+          </p:cNvSpPr>
+          <p:nvPr>
+            <p:ph type="body" idx="1"/>
+          </p:nvPr>
+        </p:nvSpPr>
+        <p:spPr/>
+        <p:txBody>
+          <a:bodyPr/>
+          <a:lstStyle/>
+          <a:p>
+            <a:pPr>
+              <a:buFont typeface="Wingdings" pitchFamily="2" charset="2"/>
+              <a:buNone/>
+            </a:pPr>
+            <a:r>
+              <a:rPr lang="en-US" sz="1400" b="1" smtClean="0"/>
+              <a:t>DocumentBuilder</a:t>
+            </a:r>
+            <a:r>
+              <a:rPr lang="en-US" sz="1400" smtClean="0"/>
+              <a:t> db = </a:t>
+            </a:r>
+            <a:r>
+              <a:rPr lang="en-US" sz="1400" b="1" smtClean="0"/>
+              <a:t>javax.xml.parsers</a:t>
+            </a:r>
+            <a:r>
+              <a:rPr lang="en-US" sz="2400" smtClean="0"/>
+              <a:t>.</a:t>
+            </a:r>
+            <a:r>
+              <a:rPr lang="en-US" sz="1400" smtClean="0"/>
+              <a:t>DocumentBuilderFactory.newInstance().newDocumentBuilder();</a:t>
+            </a:r>
+          </a:p>
+          <a:p>
+            <a:pPr>
+              <a:buFont typeface="Wingdings" pitchFamily="2" charset="2"/>
+              <a:buNone/>
+            </a:pPr>
+            <a:r>
+              <a:rPr lang="en-US" sz="1400" b="1" smtClean="0"/>
+              <a:t>Document</a:t>
+            </a:r>
+            <a:r>
+              <a:rPr lang="en-US" sz="1400" smtClean="0"/>
+              <a:t> dom = db.parse( (</a:t>
+            </a:r>
+            <a:r>
+              <a:rPr lang="en-US" sz="1400" b="1" smtClean="0"/>
+              <a:t>InputStream</a:t>
+            </a:r>
+            <a:r>
+              <a:rPr lang="en-US" sz="1400" smtClean="0"/>
+              <a:t>) </a:t>
+            </a:r>
+            <a:r>
+              <a:rPr lang="en-US" sz="1400" b="1" smtClean="0"/>
+              <a:t>in</a:t>
+            </a:r>
+            <a:r>
+              <a:rPr lang="en-US" sz="1400" smtClean="0"/>
+              <a:t>);</a:t>
+            </a:r>
+          </a:p>
+          <a:p>
+            <a:pPr>
+              <a:buFont typeface="Wingdings" pitchFamily="2" charset="2"/>
+              <a:buNone/>
+            </a:pPr>
+            <a:r>
+              <a:rPr lang="en-US" sz="1400" b="1" smtClean="0"/>
+              <a:t>NodeList</a:t>
+            </a:r>
+            <a:r>
+              <a:rPr lang="en-US" sz="1400" smtClean="0"/>
+              <a:t> nl = dom.getElementsByTagName(“</a:t>
+            </a:r>
+            <a:r>
+              <a:rPr lang="en-US" sz="1400" b="1" smtClean="0"/>
+              <a:t>entry</a:t>
+            </a:r>
+            <a:r>
+              <a:rPr lang="en-US" sz="1400" smtClean="0"/>
+              <a:t>”);</a:t>
+            </a:r>
+          </a:p>
+          <a:p>
+            <a:pPr>
+              <a:buFont typeface="Wingdings" pitchFamily="2" charset="2"/>
+              <a:buNone/>
+            </a:pPr>
+            <a:r>
+              <a:rPr lang="en-US" sz="1400" smtClean="0"/>
+              <a:t>if (nl != null) {</a:t>
+            </a:r>
+          </a:p>
+          <a:p>
+            <a:pPr>
+              <a:buFont typeface="Wingdings" pitchFamily="2" charset="2"/>
+              <a:buNone/>
+            </a:pPr>
+            <a:r>
+              <a:rPr lang="en-US" sz="1400" smtClean="0"/>
+              <a:t>	</a:t>
+            </a:r>
+            <a:r>
+              <a:rPr lang="en-US" sz="1400" b="1" smtClean="0"/>
+              <a:t>int</a:t>
+            </a:r>
+            <a:r>
+              <a:rPr lang="en-US" sz="1400" smtClean="0"/>
+              <a:t> nlLenght = nl.getLength();</a:t>
+            </a:r>
+          </a:p>
+          <a:p>
+            <a:pPr>
+              <a:buFont typeface="Wingdings" pitchFamily="2" charset="2"/>
+              <a:buNone/>
+            </a:pPr>
+            <a:r>
+              <a:rPr lang="en-US" sz="1400" smtClean="0"/>
+              <a:t>	for (</a:t>
+            </a:r>
+            <a:r>
+              <a:rPr lang="en-US" sz="1400" b="1" smtClean="0"/>
+              <a:t>int</a:t>
+            </a:r>
+            <a:r>
+              <a:rPr lang="en-US" sz="1400" smtClean="0"/>
+              <a:t> i = 0; i &lt; nlLenght; i++) {</a:t>
+            </a:r>
+          </a:p>
+          <a:p>
+            <a:pPr>
+              <a:buFont typeface="Wingdings" pitchFamily="2" charset="2"/>
+              <a:buNone/>
+            </a:pPr>
+            <a:r>
+              <a:rPr lang="en-US" sz="1400" smtClean="0"/>
+              <a:t>		</a:t>
+            </a:r>
+            <a:r>
+              <a:rPr lang="en-US" sz="1400" b="1" smtClean="0"/>
+              <a:t>Element</a:t>
+            </a:r>
+            <a:r>
+              <a:rPr lang="en-US" sz="1400" smtClean="0"/>
+              <a:t> entry = (</a:t>
+            </a:r>
+            <a:r>
+              <a:rPr lang="en-US" sz="1400" b="1" smtClean="0"/>
+              <a:t>Element</a:t>
+            </a:r>
+            <a:r>
+              <a:rPr lang="en-US" sz="1400" smtClean="0"/>
+              <a:t>) nl.item(i);</a:t>
+            </a:r>
+          </a:p>
+          <a:p>
+            <a:pPr>
+              <a:buFont typeface="Wingdings" pitchFamily="2" charset="2"/>
+              <a:buNone/>
+            </a:pPr>
+            <a:r>
+              <a:rPr lang="en-US" sz="1400" smtClean="0"/>
+              <a:t>		</a:t>
+            </a:r>
+            <a:r>
+              <a:rPr lang="en-US" sz="1400" b="1" smtClean="0"/>
+              <a:t>Element</a:t>
+            </a:r>
+            <a:r>
+              <a:rPr lang="en-US" sz="1400" smtClean="0"/>
+              <a:t> title = (</a:t>
+            </a:r>
+            <a:r>
+              <a:rPr lang="en-US" sz="1400" b="1" smtClean="0"/>
+              <a:t>Element</a:t>
+            </a:r>
+            <a:r>
+              <a:rPr lang="en-US" sz="1400" smtClean="0"/>
+              <a:t>) entry.getElementsByTagName(“</a:t>
+            </a:r>
+            <a:r>
+              <a:rPr lang="en-US" sz="1600" b="1" smtClean="0"/>
+              <a:t>title</a:t>
+            </a:r>
+            <a:r>
+              <a:rPr lang="en-US" sz="1400" smtClean="0"/>
+              <a:t>”).item(0);</a:t>
+            </a:r>
+          </a:p>
+          <a:p>
+            <a:pPr>
+              <a:buFont typeface="Wingdings" pitchFamily="2" charset="2"/>
+              <a:buNone/>
+            </a:pPr>
+            <a:r>
+              <a:rPr lang="en-US" sz="1400" smtClean="0"/>
+              <a:t>		</a:t>
+            </a:r>
+            <a:r>
+              <a:rPr lang="en-US" sz="1400" b="1" smtClean="0"/>
+              <a:t>String</a:t>
+            </a:r>
+            <a:r>
+              <a:rPr lang="en-US" sz="1400" smtClean="0"/>
+              <a:t> strTitle = title.getFirstChild().getNodeValue();</a:t>
+            </a:r>
+          </a:p>
+          <a:p>
+            <a:pPr>
+              <a:buFont typeface="Wingdings" pitchFamily="2" charset="2"/>
+              <a:buNone/>
+            </a:pPr>
+            <a:r>
+              <a:rPr lang="en-US" sz="1400" smtClean="0"/>
+              <a:t>	}</a:t>
+            </a:r>
+          </a:p>
+          <a:p>
+            <a:pPr>
+              <a:buFont typeface="Wingdings" pitchFamily="2" charset="2"/>
+              <a:buNone/>
+            </a:pPr>
+            <a:r>
+              <a:rPr lang="en-US" sz="1400" smtClean="0"/>
+              <a:t>}</a:t>
+            </a:r>
+          </a:p>
+          <a:p>
+            <a:pPr>
+              <a:buFont typeface="Wingdings" pitchFamily="2" charset="2"/>
+              <a:buNone/>
+            </a:pPr>
+            <a:endParaRPr lang="en-US" sz="1400" smtClean="0"/>
+          </a:p>
+        </p:txBody>
+      </p:sp>
+    </p:spTree>
+  </p:cSld>
+  <p:clrMapOvr>
+    <a:masterClrMapping/>
+  </p:clrMapOvr>
+</p:sld>
+</file>
+
+<file path=ppt/slides/slide11.xml><?xml version="1.0" encoding="utf-8"?>
+<p:sld xmlns:a="http://schemas.openxmlformats.org/drawingml/2006/main" xmlns:r="http://schemas.openxmlformats.org/officeDocument/2006/relationships" xmlns:p="http://schemas.openxmlformats.org/presentationml/2006/main">
+  <p:cSld>
+    <p:spTree>
+      <p:nvGrpSpPr>
+        <p:cNvPr id="1" name=""/>
+        <p:cNvGrpSpPr/>
+        <p:nvPr/>
+      </p:nvGrpSpPr>
+      <p:grpSpPr>
+        <a:xfrm>
+          <a:off x="0" y="0"/>
+          <a:ext cx="0" cy="0"/>
+          <a:chOff x="0" y="0"/>
+          <a:chExt cx="0" cy="0"/>
+        </a:xfrm>
+      </p:grpSpPr>
+      <p:sp>
+        <p:nvSpPr>
+          <p:cNvPr id="28674" name="AutoShape 2"/>
+          <p:cNvSpPr>
+            <a:spLocks noGrp="1" noChangeArrowheads="1"/>
+          </p:cNvSpPr>
+          <p:nvPr>
+            <p:ph type="title"/>
+          </p:nvPr>
+        </p:nvSpPr>
+        <p:spPr>
+          <a:xfrm>
+            <a:off x="762000" y="762000"/>
+            <a:ext cx="7924800" cy="609600"/>
+          </a:xfrm>
+        </p:spPr>
+        <p:txBody>
+          <a:bodyPr/>
+          <a:lstStyle/>
+          <a:p>
+            <a:pPr algn="r"/>
+            <a:r>
+              <a:rPr lang="en-US" sz="3200" smtClean="0"/>
+              <a:t>Xử lý với dữ liệu “text/json”</a:t>
+            </a:r>
+          </a:p>
+        </p:txBody>
+      </p:sp>
+      <p:sp>
+        <p:nvSpPr>
+          <p:cNvPr id="28675" name="Rectangle 3"/>
+          <p:cNvSpPr>
+            <a:spLocks noGrp="1" noChangeArrowheads="1"/>
+          </p:cNvSpPr>
+          <p:nvPr>
+            <p:ph type="body" idx="1"/>
+          </p:nvPr>
+        </p:nvSpPr>
+        <p:spPr/>
+        <p:txBody>
+          <a:bodyPr/>
+          <a:lstStyle/>
+          <a:p>
+            <a:r>
+              <a:rPr lang="en-US" smtClean="0"/>
+              <a:t>JSON = JavaScript Object Notation </a:t>
+            </a:r>
+          </a:p>
+          <a:p>
+            <a:pPr>
+              <a:buFont typeface="Wingdings" pitchFamily="2" charset="2"/>
+              <a:buNone/>
+            </a:pPr>
+            <a:r>
+              <a:rPr lang="en-US" smtClean="0"/>
+              <a:t>{</a:t>
+            </a:r>
+          </a:p>
+          <a:p>
+            <a:pPr>
+              <a:buFont typeface="Wingdings" pitchFamily="2" charset="2"/>
+              <a:buNone/>
+            </a:pPr>
+            <a:r>
+              <a:rPr lang="en-US" smtClean="0"/>
+              <a:t>	"s_0":"This is status message 1",</a:t>
+            </a:r>
+          </a:p>
+          <a:p>
+            <a:pPr>
+              <a:buFont typeface="Wingdings" pitchFamily="2" charset="2"/>
+              <a:buNone/>
+            </a:pPr>
+            <a:r>
+              <a:rPr lang="en-US" smtClean="0"/>
+              <a:t>	"s_1":"This is a status message for s_1",</a:t>
+            </a:r>
+          </a:p>
+          <a:p>
+            <a:pPr>
+              <a:buFont typeface="Wingdings" pitchFamily="2" charset="2"/>
+              <a:buNone/>
+            </a:pPr>
+            <a:r>
+              <a:rPr lang="en-US" smtClean="0"/>
+              <a:t>	"s_2":"a s_2 status message"</a:t>
+            </a:r>
+          </a:p>
+          <a:p>
+            <a:pPr>
+              <a:buFont typeface="Wingdings" pitchFamily="2" charset="2"/>
+              <a:buNone/>
+            </a:pPr>
+            <a:r>
+              <a:rPr lang="en-US" smtClean="0"/>
+              <a:t>}</a:t>
+            </a:r>
+          </a:p>
+        </p:txBody>
+      </p:sp>
+    </p:spTree>
+  </p:cSld>
+  <p:clrMapOvr>
+    <a:masterClrMapping/>
+  </p:clrMapOvr>
+</p:sld>
+</file>
+
+<file path=ppt/slides/slide12.xml><?xml version="1.0" encoding="utf-8"?>
+<p:sld xmlns:a="http://schemas.openxmlformats.org/drawingml/2006/main" xmlns:r="http://schemas.openxmlformats.org/officeDocument/2006/relationships" xmlns:p="http://schemas.openxmlformats.org/presentationml/2006/main">
+  <p:cSld>
+    <p:spTree>
+      <p:nvGrpSpPr>
+        <p:cNvPr id="1" name=""/>
+        <p:cNvGrpSpPr/>
+        <p:nvPr/>
+      </p:nvGrpSpPr>
+      <p:grpSpPr>
+        <a:xfrm>
+          <a:off x="0" y="0"/>
+          <a:ext cx="0" cy="0"/>
+          <a:chOff x="0" y="0"/>
+          <a:chExt cx="0" cy="0"/>
+        </a:xfrm>
+      </p:grpSpPr>
+      <p:sp>
+        <p:nvSpPr>
+          <p:cNvPr id="33794" name="AutoShape 2"/>
+          <p:cNvSpPr>
+            <a:spLocks noGrp="1" noChangeArrowheads="1"/>
+          </p:cNvSpPr>
+          <p:nvPr>
+            <p:ph type="title"/>
+          </p:nvPr>
+        </p:nvSpPr>
+        <p:spPr>
+          <a:xfrm>
+            <a:off x="762000" y="762000"/>
+            <a:ext cx="7924800" cy="762000"/>
+          </a:xfrm>
+        </p:spPr>
+        <p:txBody>
+          <a:bodyPr/>
+          <a:lstStyle/>
+          <a:p>
+            <a:pPr algn="r"/>
+            <a:r>
+              <a:rPr lang="en-US" smtClean="0"/>
+              <a:t>Thao tác XML với JSONObject</a:t>
+            </a:r>
+          </a:p>
+        </p:txBody>
+      </p:sp>
+      <p:sp>
+        <p:nvSpPr>
+          <p:cNvPr id="33795" name="Rectangle 3"/>
+          <p:cNvSpPr>
+            <a:spLocks noGrp="1" noChangeArrowheads="1"/>
+          </p:cNvSpPr>
+          <p:nvPr>
+            <p:ph type="body" idx="1"/>
+          </p:nvPr>
+        </p:nvSpPr>
+        <p:spPr/>
+        <p:txBody>
+          <a:bodyPr/>
+          <a:lstStyle/>
+          <a:p>
+            <a:r>
+              <a:rPr lang="en-US" sz="2400" smtClean="0"/>
+              <a:t>Thao tác tạo mới JSONObject</a:t>
+            </a:r>
+          </a:p>
+          <a:p>
+            <a:pPr lvl="3">
+              <a:buFontTx/>
+              <a:buNone/>
+            </a:pPr>
+            <a:r>
+              <a:rPr lang="en-US" sz="1200" smtClean="0"/>
+              <a:t>JSONObject resultJO = </a:t>
+            </a:r>
+            <a:r>
+              <a:rPr lang="en-US" sz="1200" b="1" smtClean="0"/>
+              <a:t>null</a:t>
+            </a:r>
+            <a:r>
+              <a:rPr lang="en-US" sz="1200" smtClean="0"/>
+              <a:t>;</a:t>
+            </a:r>
+          </a:p>
+          <a:p>
+            <a:pPr lvl="3">
+              <a:buFontTx/>
+              <a:buNone/>
+            </a:pPr>
+            <a:r>
+              <a:rPr lang="en-US" sz="1200" b="1" smtClean="0"/>
+              <a:t>try</a:t>
+            </a:r>
+            <a:r>
+              <a:rPr lang="en-US" sz="1200" smtClean="0"/>
+              <a:t> {</a:t>
+            </a:r>
+          </a:p>
+          <a:p>
+            <a:pPr lvl="4">
+              <a:buFont typeface="Wingdings" pitchFamily="2" charset="2"/>
+              <a:buNone/>
+            </a:pPr>
+            <a:r>
+              <a:rPr lang="en-US" sz="1200" smtClean="0"/>
+              <a:t>resultJO = </a:t>
+            </a:r>
+            <a:r>
+              <a:rPr lang="en-US" sz="1200" b="1" smtClean="0"/>
+              <a:t>new</a:t>
+            </a:r>
+            <a:r>
+              <a:rPr lang="en-US" sz="1200" smtClean="0"/>
+              <a:t> JSONObject();</a:t>
+            </a:r>
+          </a:p>
+          <a:p>
+            <a:pPr lvl="4">
+              <a:buFont typeface="Wingdings" pitchFamily="2" charset="2"/>
+              <a:buNone/>
+            </a:pPr>
+            <a:r>
+              <a:rPr lang="en-US" sz="1200" smtClean="0"/>
+              <a:t>resultJO.put(</a:t>
+            </a:r>
+            <a:r>
+              <a:rPr lang="en-US" sz="1200" i="1" smtClean="0"/>
+              <a:t>“s_0”</a:t>
+            </a:r>
+            <a:r>
+              <a:rPr lang="en-US" sz="1200" smtClean="0"/>
+              <a:t>, “This is status message 1”);</a:t>
+            </a:r>
+          </a:p>
+          <a:p>
+            <a:pPr lvl="4">
+              <a:buFont typeface="Wingdings" pitchFamily="2" charset="2"/>
+              <a:buNone/>
+            </a:pPr>
+            <a:r>
+              <a:rPr lang="en-US" sz="1200" smtClean="0"/>
+              <a:t>resultJO.put (</a:t>
+            </a:r>
+            <a:r>
+              <a:rPr lang="en-US" sz="1200" i="1" smtClean="0"/>
+              <a:t>“s_1”</a:t>
+            </a:r>
+            <a:r>
+              <a:rPr lang="en-US" sz="1200" smtClean="0"/>
+              <a:t>, “This is a status message for s_1”);</a:t>
+            </a:r>
+          </a:p>
+          <a:p>
+            <a:pPr lvl="4">
+              <a:buFont typeface="Wingdings" pitchFamily="2" charset="2"/>
+              <a:buNone/>
+            </a:pPr>
+            <a:r>
+              <a:rPr lang="en-US" sz="1200" smtClean="0"/>
+              <a:t>resultJO.put (</a:t>
+            </a:r>
+            <a:r>
+              <a:rPr lang="en-US" sz="1200" i="1" smtClean="0"/>
+              <a:t>“s_2”</a:t>
+            </a:r>
+            <a:r>
+              <a:rPr lang="en-US" sz="1200" smtClean="0"/>
+              <a:t>, “a s_2 status message”);</a:t>
+            </a:r>
+          </a:p>
+          <a:p>
+            <a:pPr lvl="3">
+              <a:buFontTx/>
+              <a:buNone/>
+            </a:pPr>
+            <a:r>
+              <a:rPr lang="en-US" sz="1200" smtClean="0"/>
+              <a:t>} </a:t>
+            </a:r>
+            <a:r>
+              <a:rPr lang="en-US" sz="1200" b="1" smtClean="0"/>
+              <a:t>catch</a:t>
+            </a:r>
+            <a:r>
+              <a:rPr lang="en-US" sz="1200" smtClean="0"/>
+              <a:t> (JSONException e) {</a:t>
+            </a:r>
+          </a:p>
+          <a:p>
+            <a:pPr lvl="3">
+              <a:buFontTx/>
+              <a:buNone/>
+            </a:pPr>
+            <a:r>
+              <a:rPr lang="en-US" sz="1200" smtClean="0"/>
+              <a:t>	resultJO = </a:t>
+            </a:r>
+            <a:r>
+              <a:rPr lang="en-US" sz="1200" b="1" smtClean="0"/>
+              <a:t>null</a:t>
+            </a:r>
+            <a:r>
+              <a:rPr lang="en-US" sz="1200" smtClean="0"/>
+              <a:t>;</a:t>
+            </a:r>
+          </a:p>
+          <a:p>
+            <a:pPr lvl="3">
+              <a:buFontTx/>
+              <a:buNone/>
+            </a:pPr>
+            <a:r>
+              <a:rPr lang="en-US" sz="1200" smtClean="0"/>
+              <a:t>}</a:t>
+            </a:r>
+          </a:p>
+          <a:p>
+            <a:r>
+              <a:rPr lang="en-US" sz="2400" smtClean="0"/>
+              <a:t>Thao tác nhận đối tượng JSONObject từ chuỗi: </a:t>
+            </a:r>
+          </a:p>
+          <a:p>
+            <a:pPr>
+              <a:buFont typeface="Wingdings" pitchFamily="2" charset="2"/>
+              <a:buNone/>
+            </a:pPr>
+            <a:r>
+              <a:rPr lang="en-US" sz="2400" smtClean="0"/>
+              <a:t>		</a:t>
+            </a:r>
+            <a:r>
+              <a:rPr lang="en-US" sz="1600" b="1" smtClean="0"/>
+              <a:t>JSONObject</a:t>
+            </a:r>
+            <a:r>
+              <a:rPr lang="en-US" sz="1600" smtClean="0"/>
+              <a:t> jsonFromString = new </a:t>
+            </a:r>
+            <a:r>
+              <a:rPr lang="en-US" sz="1600" b="1" smtClean="0"/>
+              <a:t>JSONObject</a:t>
+            </a:r>
+            <a:r>
+              <a:rPr lang="en-US" sz="1600" smtClean="0"/>
+              <a:t>( (</a:t>
+            </a:r>
+            <a:r>
+              <a:rPr lang="en-US" sz="1600" b="1" smtClean="0"/>
+              <a:t>String</a:t>
+            </a:r>
+            <a:r>
+              <a:rPr lang="en-US" sz="1600" smtClean="0"/>
+              <a:t>) strData);</a:t>
+            </a:r>
+          </a:p>
+          <a:p>
+            <a:endParaRPr lang="en-US" sz="1200" smtClean="0"/>
+          </a:p>
+        </p:txBody>
+      </p:sp>
+    </p:spTree>
+  </p:cSld>
+  <p:clrMapOvr>
+    <a:masterClrMapping/>
+  </p:clrMapOvr>
+</p:sld>
+</file>
+
+<file path=ppt/slides/slide13.xml><?xml version="1.0" encoding="utf-8"?>
+<p:sld xmlns:a="http://schemas.openxmlformats.org/drawingml/2006/main" xmlns:r="http://schemas.openxmlformats.org/officeDocument/2006/relationships" xmlns:p="http://schemas.openxmlformats.org/presentationml/2006/main">
+  <p:cSld>
+    <p:spTree>
+      <p:nvGrpSpPr>
+        <p:cNvPr id="1" name=""/>
+        <p:cNvGrpSpPr/>
+        <p:nvPr/>
+      </p:nvGrpSpPr>
+      <p:grpSpPr>
+        <a:xfrm>
+          <a:off x="0" y="0"/>
+          <a:ext cx="0" cy="0"/>
+          <a:chOff x="0" y="0"/>
+          <a:chExt cx="0" cy="0"/>
+        </a:xfrm>
+      </p:grpSpPr>
+      <p:sp>
+        <p:nvSpPr>
+          <p:cNvPr id="34818" name="AutoShape 2"/>
+          <p:cNvSpPr>
+            <a:spLocks noGrp="1" noChangeArrowheads="1"/>
+          </p:cNvSpPr>
+          <p:nvPr>
+            <p:ph type="title"/>
+          </p:nvPr>
+        </p:nvSpPr>
+        <p:spPr>
+          <a:xfrm>
+            <a:off x="762000" y="762000"/>
+            <a:ext cx="7924800" cy="609600"/>
+          </a:xfrm>
+        </p:spPr>
+        <p:txBody>
+          <a:bodyPr/>
+          <a:lstStyle/>
+          <a:p>
+            <a:pPr algn="r"/>
+            <a:r>
+              <a:rPr lang="en-US" sz="3200" smtClean="0"/>
+              <a:t>Xử lý nhận dữ liệu với Thread</a:t>
+            </a:r>
+          </a:p>
+        </p:txBody>
+      </p:sp>
+      <p:sp>
+        <p:nvSpPr>
+          <p:cNvPr id="34819" name="Rectangle 3"/>
+          <p:cNvSpPr>
+            <a:spLocks noGrp="1" noChangeArrowheads="1"/>
+          </p:cNvSpPr>
+          <p:nvPr>
+            <p:ph type="body" idx="1"/>
+          </p:nvPr>
+        </p:nvSpPr>
+        <p:spPr/>
+        <p:txBody>
+          <a:bodyPr/>
+          <a:lstStyle/>
+          <a:p>
+            <a:pPr lvl="1">
+              <a:buFontTx/>
+              <a:buNone/>
+            </a:pPr>
+            <a:r>
+              <a:rPr lang="en-US" smtClean="0"/>
+              <a:t>	Runnable runnable = </a:t>
+            </a:r>
+            <a:r>
+              <a:rPr lang="en-US" b="1" smtClean="0"/>
+              <a:t>new</a:t>
+            </a:r>
+            <a:r>
+              <a:rPr lang="en-US" smtClean="0"/>
+              <a:t> Runnable() {</a:t>
+            </a:r>
+          </a:p>
+          <a:p>
+            <a:pPr lvl="1">
+              <a:buFontTx/>
+              <a:buNone/>
+            </a:pPr>
+            <a:r>
+              <a:rPr lang="en-US" smtClean="0"/>
+              <a:t>	 	     @Override</a:t>
+            </a:r>
+          </a:p>
+          <a:p>
+            <a:pPr lvl="3">
+              <a:buFontTx/>
+              <a:buNone/>
+            </a:pPr>
+            <a:r>
+              <a:rPr lang="en-US" b="1" smtClean="0"/>
+              <a:t>public</a:t>
+            </a:r>
+            <a:r>
+              <a:rPr lang="en-US" smtClean="0"/>
+              <a:t> </a:t>
+            </a:r>
+            <a:r>
+              <a:rPr lang="en-US" b="1" smtClean="0"/>
+              <a:t>void</a:t>
+            </a:r>
+            <a:r>
+              <a:rPr lang="en-US" smtClean="0"/>
+              <a:t> run() {</a:t>
+            </a:r>
+          </a:p>
+          <a:p>
+            <a:pPr lvl="3">
+              <a:buFontTx/>
+              <a:buNone/>
+            </a:pPr>
+            <a:r>
+              <a:rPr lang="en-US" smtClean="0"/>
+              <a:t>		doGetData(</a:t>
+            </a:r>
+            <a:r>
+              <a:rPr lang="en-US" u="sng" smtClean="0"/>
+              <a:t>mURL</a:t>
+            </a:r>
+            <a:r>
+              <a:rPr lang="en-US" smtClean="0"/>
+              <a:t>);</a:t>
+            </a:r>
+          </a:p>
+          <a:p>
+            <a:pPr lvl="3">
+              <a:buFontTx/>
+              <a:buNone/>
+            </a:pPr>
+            <a:r>
+              <a:rPr lang="en-US" smtClean="0"/>
+              <a:t>}</a:t>
+            </a:r>
+          </a:p>
+          <a:p>
+            <a:pPr lvl="2">
+              <a:buFont typeface="Wingdings" pitchFamily="2" charset="2"/>
+              <a:buNone/>
+            </a:pPr>
+            <a:r>
+              <a:rPr lang="en-US" smtClean="0"/>
+              <a:t>};</a:t>
+            </a:r>
+          </a:p>
+          <a:p>
+            <a:pPr lvl="2">
+              <a:buFont typeface="Wingdings" pitchFamily="2" charset="2"/>
+              <a:buNone/>
+            </a:pPr>
+            <a:r>
+              <a:rPr lang="en-US" b="1" smtClean="0"/>
+              <a:t>new</a:t>
+            </a:r>
+            <a:r>
+              <a:rPr lang="en-US" smtClean="0"/>
+              <a:t> Thread(runnable).start();</a:t>
+            </a:r>
+          </a:p>
+        </p:txBody>
+      </p:sp>
+    </p:spTree>
+  </p:cSld>
+  <p:clrMapOvr>
+    <a:masterClrMapping/>
+  </p:clrMapOvr>
+</p:sld>
+</file>
+
+<file path=ppt/slides/slide14.xml><?xml version="1.0" encoding="utf-8"?>
+<p:sld xmlns:a="http://schemas.openxmlformats.org/drawingml/2006/main" xmlns:r="http://schemas.openxmlformats.org/officeDocument/2006/relationships" xmlns:p="http://schemas.openxmlformats.org/presentationml/2006/main">
+  <p:cSld>
+    <p:spTree>
+      <p:nvGrpSpPr>
+        <p:cNvPr id="1" name=""/>
+        <p:cNvGrpSpPr/>
+        <p:nvPr/>
+      </p:nvGrpSpPr>
+      <p:grpSpPr>
+        <a:xfrm>
+          <a:off x="0" y="0"/>
+          <a:ext cx="0" cy="0"/>
+          <a:chOff x="0" y="0"/>
+          <a:chExt cx="0" cy="0"/>
+        </a:xfrm>
+      </p:grpSpPr>
+      <p:sp>
+        <p:nvSpPr>
+          <p:cNvPr id="29698" name="AutoShape 2"/>
+          <p:cNvSpPr>
+            <a:spLocks noGrp="1" noChangeArrowheads="1"/>
+          </p:cNvSpPr>
+          <p:nvPr>
+            <p:ph type="title"/>
+          </p:nvPr>
+        </p:nvSpPr>
+        <p:spPr>
+          <a:xfrm>
+            <a:off x="762000" y="762000"/>
+            <a:ext cx="7924800" cy="609600"/>
+          </a:xfrm>
+        </p:spPr>
+        <p:txBody>
+          <a:bodyPr/>
+          <a:lstStyle/>
+          <a:p>
+            <a:pPr algn="r"/>
+            <a:r>
+              <a:rPr lang="en-US" sz="3200" smtClean="0"/>
+              <a:t>Xử lý nhận dữ liệu với AsyncTask</a:t>
+            </a:r>
+          </a:p>
+        </p:txBody>
+      </p:sp>
+      <p:sp>
+        <p:nvSpPr>
+          <p:cNvPr id="29699" name="Rectangle 3"/>
+          <p:cNvSpPr>
+            <a:spLocks noGrp="1" noChangeArrowheads="1"/>
+          </p:cNvSpPr>
+          <p:nvPr>
+            <p:ph type="body" idx="1"/>
+          </p:nvPr>
+        </p:nvSpPr>
+        <p:spPr/>
+        <p:txBody>
+          <a:bodyPr/>
+          <a:lstStyle/>
+          <a:p>
+            <a:pPr>
+              <a:lnSpc>
+                <a:spcPct val="90000"/>
+              </a:lnSpc>
+            </a:pPr>
+            <a:r>
+              <a:rPr lang="en-US" sz="2000" smtClean="0"/>
+              <a:t>Lớp xử lý AsyncTask cho phép ứng dụng xử lý/thao tác dữ liệu ở nền (background) và trả kết quả cho luồng xử lý giao diện.</a:t>
+            </a:r>
+          </a:p>
+          <a:p>
+            <a:pPr>
+              <a:lnSpc>
+                <a:spcPct val="90000"/>
+              </a:lnSpc>
+            </a:pPr>
+            <a:r>
+              <a:rPr lang="en-US" sz="2000" smtClean="0"/>
+              <a:t>Việc xử lý tác vụ được thực hiện bất đồng bộ qua 4 bước bằng 4 hàm callback: </a:t>
+            </a:r>
+          </a:p>
+          <a:p>
+            <a:pPr lvl="1">
+              <a:lnSpc>
+                <a:spcPct val="90000"/>
+              </a:lnSpc>
+            </a:pPr>
+            <a:r>
+              <a:rPr lang="en-US" sz="1800" b="1" smtClean="0"/>
+              <a:t>protected void onPreExecute ();</a:t>
+            </a:r>
+          </a:p>
+          <a:p>
+            <a:pPr lvl="1">
+              <a:lnSpc>
+                <a:spcPct val="90000"/>
+              </a:lnSpc>
+            </a:pPr>
+            <a:r>
+              <a:rPr lang="en-US" sz="1800" b="1" smtClean="0"/>
+              <a:t>protected abstract Result doInBackground (Params... params);</a:t>
+            </a:r>
+          </a:p>
+          <a:p>
+            <a:pPr lvl="1">
+              <a:lnSpc>
+                <a:spcPct val="90000"/>
+              </a:lnSpc>
+            </a:pPr>
+            <a:r>
+              <a:rPr lang="en-US" sz="1800" b="1" smtClean="0"/>
+              <a:t>protected void onProgressUpdate (Progress... values);</a:t>
+            </a:r>
+          </a:p>
+          <a:p>
+            <a:pPr lvl="1">
+              <a:lnSpc>
+                <a:spcPct val="90000"/>
+              </a:lnSpc>
+            </a:pPr>
+            <a:r>
+              <a:rPr lang="en-US" sz="1800" b="1" smtClean="0"/>
+              <a:t>protected void onPostExecute (Result result);</a:t>
+            </a:r>
+          </a:p>
+          <a:p>
+            <a:pPr lvl="1">
+              <a:lnSpc>
+                <a:spcPct val="90000"/>
+              </a:lnSpc>
+              <a:buFontTx/>
+              <a:buNone/>
+            </a:pPr>
+            <a:r>
+              <a:rPr lang="en-US" sz="2000" smtClean="0"/>
+              <a:t>Và gọi thực thi tác vụ bằng hàm: </a:t>
+            </a:r>
+          </a:p>
+          <a:p>
+            <a:pPr lvl="1">
+              <a:lnSpc>
+                <a:spcPct val="90000"/>
+              </a:lnSpc>
+            </a:pPr>
+            <a:r>
+              <a:rPr lang="en-US" sz="1800" b="1" smtClean="0"/>
+              <a:t>public final </a:t>
+            </a:r>
+            <a:r>
+              <a:rPr lang="en-US" sz="1800" b="1" smtClean="0">
+                <a:hlinkClick r:id="rId2" action="ppaction://hlinkfile"/>
+              </a:rPr>
+              <a:t>AsyncTask</a:t>
+            </a:r>
+            <a:r>
+              <a:rPr lang="en-US" sz="1800" b="1" smtClean="0"/>
+              <a:t>&lt;Params, Progress, Result&gt; execute (Params... params)</a:t>
+            </a:r>
+          </a:p>
+          <a:p>
+            <a:pPr lvl="1">
+              <a:lnSpc>
+                <a:spcPct val="90000"/>
+              </a:lnSpc>
+              <a:buFontTx/>
+              <a:buNone/>
+            </a:pPr>
+            <a:endParaRPr lang="en-US" sz="1800" b="1" smtClean="0"/>
+          </a:p>
+          <a:p>
+            <a:pPr lvl="1">
+              <a:lnSpc>
+                <a:spcPct val="90000"/>
+              </a:lnSpc>
+            </a:pPr>
+            <a:endParaRPr lang="en-US" sz="1800" smtClean="0"/>
+          </a:p>
+        </p:txBody>
+      </p:sp>
+    </p:spTree>
+  </p:cSld>
+  <p:clrMapOvr>
+    <a:masterClrMapping/>
+  </p:clrMapOvr>
+</p:sld>
+</file>
+
+<file path=ppt/slides/slide15.xml><?xml version="1.0" encoding="utf-8"?>
+<p:sld xmlns:a="http://schemas.openxmlformats.org/drawingml/2006/main" xmlns:r="http://schemas.openxmlformats.org/officeDocument/2006/relationships" xmlns:p="http://schemas.openxmlformats.org/presentationml/2006/main">
+  <p:cSld>
+    <p:spTree>
+      <p:nvGrpSpPr>
+        <p:cNvPr id="1" name=""/>
+        <p:cNvGrpSpPr/>
+        <p:nvPr/>
+      </p:nvGrpSpPr>
+      <p:grpSpPr>
+        <a:xfrm>
+          <a:off x="0" y="0"/>
+          <a:ext cx="0" cy="0"/>
+          <a:chOff x="0" y="0"/>
+          <a:chExt cx="0" cy="0"/>
+        </a:xfrm>
+      </p:grpSpPr>
+      <p:sp>
+        <p:nvSpPr>
+          <p:cNvPr id="30722" name="AutoShape 2"/>
+          <p:cNvSpPr>
+            <a:spLocks noGrp="1" noChangeArrowheads="1"/>
+          </p:cNvSpPr>
+          <p:nvPr>
+            <p:ph type="title"/>
+          </p:nvPr>
+        </p:nvSpPr>
+        <p:spPr>
+          <a:xfrm>
+            <a:off x="762000" y="762000"/>
+            <a:ext cx="7924800" cy="685800"/>
+          </a:xfrm>
+        </p:spPr>
+        <p:txBody>
+          <a:bodyPr/>
+          <a:lstStyle/>
+          <a:p>
+            <a:pPr algn="r"/>
+            <a:r>
+              <a:rPr lang="en-US" sz="3200" smtClean="0"/>
+              <a:t>Xử lý nhận dữ liệu với AsyncTask</a:t>
+            </a:r>
+          </a:p>
+        </p:txBody>
+      </p:sp>
+      <p:sp>
+        <p:nvSpPr>
+          <p:cNvPr id="30723" name="Rectangle 3"/>
+          <p:cNvSpPr>
+            <a:spLocks noGrp="1" noChangeArrowheads="1"/>
+          </p:cNvSpPr>
+          <p:nvPr>
+            <p:ph type="body" idx="1"/>
+          </p:nvPr>
+        </p:nvSpPr>
+        <p:spPr/>
+        <p:txBody>
+          <a:bodyPr/>
+          <a:lstStyle/>
+          <a:p>
+            <a:pPr>
+              <a:lnSpc>
+                <a:spcPct val="80000"/>
+              </a:lnSpc>
+            </a:pPr>
+            <a:r>
+              <a:rPr lang="en-US" sz="1200" smtClean="0"/>
+              <a:t>Ví dụ: </a:t>
+            </a:r>
+          </a:p>
+          <a:p>
+            <a:pPr>
+              <a:lnSpc>
+                <a:spcPct val="80000"/>
+              </a:lnSpc>
+              <a:buFont typeface="Wingdings" pitchFamily="2" charset="2"/>
+              <a:buNone/>
+            </a:pPr>
+            <a:r>
+              <a:rPr lang="en-US" sz="1200" smtClean="0"/>
+              <a:t>	private class DownloadFilesTask extends AsyncTask&lt;URL, Integer, Long&gt; {</a:t>
+            </a:r>
+            <a:br>
+              <a:rPr lang="en-US" sz="1200" smtClean="0"/>
+            </a:br>
+            <a:r>
+              <a:rPr lang="en-US" sz="1200" smtClean="0"/>
+              <a:t>     protected Long doInBackground(URL... urls) {</a:t>
+            </a:r>
+            <a:br>
+              <a:rPr lang="en-US" sz="1200" smtClean="0"/>
+            </a:br>
+            <a:r>
+              <a:rPr lang="en-US" sz="1200" smtClean="0"/>
+              <a:t>         int count = urls.length;</a:t>
+            </a:r>
+            <a:br>
+              <a:rPr lang="en-US" sz="1200" smtClean="0"/>
+            </a:br>
+            <a:r>
+              <a:rPr lang="en-US" sz="1200" smtClean="0"/>
+              <a:t>         long totalSize = 0;</a:t>
+            </a:r>
+            <a:br>
+              <a:rPr lang="en-US" sz="1200" smtClean="0"/>
+            </a:br>
+            <a:r>
+              <a:rPr lang="en-US" sz="1200" smtClean="0"/>
+              <a:t>         for (int i = 0; i &lt; count; i++) {</a:t>
+            </a:r>
+            <a:br>
+              <a:rPr lang="en-US" sz="1200" smtClean="0"/>
+            </a:br>
+            <a:r>
+              <a:rPr lang="en-US" sz="1200" smtClean="0"/>
+              <a:t>             </a:t>
+            </a:r>
+          </a:p>
+          <a:p>
+            <a:pPr>
+              <a:lnSpc>
+                <a:spcPct val="80000"/>
+              </a:lnSpc>
+              <a:buFont typeface="Wingdings" pitchFamily="2" charset="2"/>
+              <a:buNone/>
+            </a:pPr>
+            <a:r>
+              <a:rPr lang="en-US" sz="1200" smtClean="0"/>
+              <a:t>                }</a:t>
+            </a:r>
+            <a:br>
+              <a:rPr lang="en-US" sz="1200" smtClean="0"/>
+            </a:br>
+            <a:r>
+              <a:rPr lang="en-US" sz="1200" smtClean="0"/>
+              <a:t>         return totalSize;</a:t>
+            </a:r>
+            <a:br>
+              <a:rPr lang="en-US" sz="1200" smtClean="0"/>
+            </a:br>
+            <a:r>
+              <a:rPr lang="en-US" sz="1200" smtClean="0"/>
+              <a:t>     }</a:t>
+            </a:r>
+            <a:br>
+              <a:rPr lang="en-US" sz="1200" smtClean="0"/>
+            </a:br>
+            <a:r>
+              <a:rPr lang="en-US" sz="1200" smtClean="0"/>
+              <a:t/>
+            </a:r>
+            <a:br>
+              <a:rPr lang="en-US" sz="1200" smtClean="0"/>
+            </a:br>
+            <a:r>
+              <a:rPr lang="en-US" sz="1200" smtClean="0"/>
+              <a:t>     protected void onProgressUpdate(Integer... progress) {</a:t>
+            </a:r>
+            <a:br>
+              <a:rPr lang="en-US" sz="1200" smtClean="0"/>
+            </a:br>
+            <a:r>
+              <a:rPr lang="en-US" sz="1200" smtClean="0"/>
+              <a:t>         setProgressPercent(progress[0]);</a:t>
+            </a:r>
+            <a:br>
+              <a:rPr lang="en-US" sz="1200" smtClean="0"/>
+            </a:br>
+            <a:r>
+              <a:rPr lang="en-US" sz="1200" smtClean="0"/>
+              <a:t>     }</a:t>
+            </a:r>
+            <a:br>
+              <a:rPr lang="en-US" sz="1200" smtClean="0"/>
+            </a:br>
+            <a:r>
+              <a:rPr lang="en-US" sz="1200" smtClean="0"/>
+              <a:t/>
+            </a:r>
+            <a:br>
+              <a:rPr lang="en-US" sz="1200" smtClean="0"/>
+            </a:br>
+            <a:r>
+              <a:rPr lang="en-US" sz="1200" smtClean="0"/>
+              <a:t>     protected void onPostExecute(Long result) {</a:t>
+            </a:r>
+            <a:br>
+              <a:rPr lang="en-US" sz="1200" smtClean="0"/>
+            </a:br>
+            <a:r>
+              <a:rPr lang="en-US" sz="1200" smtClean="0"/>
+              <a:t>         showDialog("Downloaded " + result + " bytes");</a:t>
+            </a:r>
+            <a:br>
+              <a:rPr lang="en-US" sz="1200" smtClean="0"/>
+            </a:br>
+            <a:r>
+              <a:rPr lang="en-US" sz="1200" smtClean="0"/>
+              <a:t>     }</a:t>
+            </a:r>
+            <a:br>
+              <a:rPr lang="en-US" sz="1200" smtClean="0"/>
+            </a:br>
+            <a:r>
+              <a:rPr lang="en-US" sz="1200" smtClean="0"/>
+              <a:t> }</a:t>
+            </a:r>
+            <a:br>
+              <a:rPr lang="en-US" sz="1200" smtClean="0"/>
+            </a:br>
+            <a:r>
+              <a:rPr lang="en-US" sz="1200" smtClean="0"/>
+              <a:t>new DownloadFilesTask().execute(url1, url2, url3);</a:t>
+            </a:r>
+            <a:br>
+              <a:rPr lang="en-US" sz="1200" smtClean="0"/>
+            </a:br>
+            <a:endParaRPr lang="en-US" sz="1200" smtClean="0"/>
+          </a:p>
+        </p:txBody>
+      </p:sp>
+    </p:spTree>
+  </p:cSld>
+  <p:clrMapOvr>
+    <a:masterClrMapping/>
+  </p:clrMapOvr>
+</p:sld>
+</file>
+
+<file path=ppt/slides/slide16.xml><?xml version="1.0" encoding="utf-8"?>
+<p:sld xmlns:a="http://schemas.openxmlformats.org/drawingml/2006/main" xmlns:r="http://schemas.openxmlformats.org/officeDocument/2006/relationships" xmlns:p="http://schemas.openxmlformats.org/presentationml/2006/main">
+  <p:cSld>
+    <p:spTree>
+      <p:nvGrpSpPr>
+        <p:cNvPr id="1" name=""/>
+        <p:cNvGrpSpPr/>
+        <p:nvPr/>
+      </p:nvGrpSpPr>
+      <p:grpSpPr>
+        <a:xfrm>
+          <a:off x="0" y="0"/>
+          <a:ext cx="0" cy="0"/>
+          <a:chOff x="0" y="0"/>
+          <a:chExt cx="0" cy="0"/>
+        </a:xfrm>
+      </p:grpSpPr>
+      <p:sp>
+        <p:nvSpPr>
+          <p:cNvPr id="25601" name="Date Placeholder 3"/>
           <p:cNvSpPr>
             <a:spLocks noGrp="1"/>
           </p:cNvSpPr>
@@ -5058,10 +6342,10 @@
           <a:bodyPr/>
           <a:lstStyle/>
           <a:p>
-            <a:fld id="{2E2C9BE7-801E-4290-8DF0-4457ED1CEFCB}" type="datetime1">
+            <a:fld id="{380D7946-F6D3-486B-A6FA-2F0A28FD34C8}" type="datetime1">
               <a:rPr lang="vi-VN" smtClean="0"/>
               <a:pPr/>
-              <a:t>02/11/2011</a:t>
+              <a:t>04/11/2011</a:t>
             </a:fld>
             <a:endParaRPr lang="en-US" smtClean="0"/>
           </a:p>
@@ -5069,7 +6353,7 @@
       </p:sp>
       <p:sp>
         <p:nvSpPr>
-          <p:cNvPr id="38914" name="Footer Placeholder 4"/>
+          <p:cNvPr id="25602" name="Footer Placeholder 4"/>
           <p:cNvSpPr>
             <a:spLocks noGrp="1"/>
           </p:cNvSpPr>
@@ -5093,7 +6377,7 @@
       </p:sp>
       <p:sp>
         <p:nvSpPr>
-          <p:cNvPr id="38915" name="Slide Number Placeholder 5"/>
+          <p:cNvPr id="25603" name="Slide Number Placeholder 5"/>
           <p:cNvSpPr>
             <a:spLocks noGrp="1"/>
           </p:cNvSpPr>
@@ -5108,10 +6392,10 @@
           <a:bodyPr/>
           <a:lstStyle/>
           <a:p>
-            <a:fld id="{69623FB0-B0DD-4BA9-81FC-B402DB182B47}" type="slidenum">
+            <a:fld id="{240419D6-FD16-4DC9-A72C-1FB6CF8BBF6A}" type="slidenum">
               <a:rPr lang="en-US" smtClean="0"/>
               <a:pPr/>
-              <a:t>10</a:t>
+              <a:t>16</a:t>
             </a:fld>
             <a:endParaRPr lang="en-US" smtClean="0"/>
           </a:p>
@@ -5119,7 +6403,7 @@
       </p:sp>
       <p:sp>
         <p:nvSpPr>
-          <p:cNvPr id="38916" name="AutoShape 2"/>
+          <p:cNvPr id="25604" name="AutoShape 2"/>
           <p:cNvSpPr>
             <a:spLocks noGrp="1" noChangeArrowheads="1"/>
           </p:cNvSpPr>
@@ -5142,7 +6426,7 @@
       </p:sp>
       <p:pic>
         <p:nvPicPr>
-          <p:cNvPr id="38917" name="Picture 6" descr="Thank you"/>
+          <p:cNvPr id="25605" name="Picture 6" descr="Thank you"/>
           <p:cNvPicPr>
             <a:picLocks noChangeAspect="1" noChangeArrowheads="1"/>
           </p:cNvPicPr>
@@ -5199,7 +6483,7 @@
       </p:grpSpPr>
       <p:sp>
         <p:nvSpPr>
-          <p:cNvPr id="40962" name="AutoShape 2"/>
+          <p:cNvPr id="17409" name="AutoShape 2"/>
           <p:cNvSpPr>
             <a:spLocks noGrp="1" noChangeArrowheads="1"/>
           </p:cNvSpPr>
@@ -5227,7 +6511,7 @@
       </p:sp>
       <p:sp>
         <p:nvSpPr>
-          <p:cNvPr id="40963" name="Rectangle 3"/>
+          <p:cNvPr id="17410" name="Rectangle 3"/>
           <p:cNvSpPr>
             <a:spLocks noGrp="1" noChangeArrowheads="1"/>
           </p:cNvSpPr>
@@ -5292,7 +6576,7 @@
       </p:grpSpPr>
       <p:sp>
         <p:nvSpPr>
-          <p:cNvPr id="43010" name="AutoShape 2"/>
+          <p:cNvPr id="18433" name="AutoShape 2"/>
           <p:cNvSpPr>
             <a:spLocks noGrp="1" noChangeArrowheads="1"/>
           </p:cNvSpPr>
@@ -5320,7 +6604,7 @@
       </p:sp>
       <p:sp>
         <p:nvSpPr>
-          <p:cNvPr id="43011" name="Rectangle 3"/>
+          <p:cNvPr id="18434" name="Rectangle 3"/>
           <p:cNvSpPr>
             <a:spLocks noGrp="1" noChangeArrowheads="1"/>
           </p:cNvSpPr>
@@ -5406,7 +6690,7 @@
       </p:grpSpPr>
       <p:sp>
         <p:nvSpPr>
-          <p:cNvPr id="41986" name="AutoShape 2"/>
+          <p:cNvPr id="19457" name="AutoShape 2"/>
           <p:cNvSpPr>
             <a:spLocks noGrp="1" noChangeArrowheads="1"/>
           </p:cNvSpPr>
@@ -5434,7 +6718,7 @@
       </p:sp>
       <p:sp>
         <p:nvSpPr>
-          <p:cNvPr id="41987" name="Rectangle 3"/>
+          <p:cNvPr id="19458" name="Rectangle 3"/>
           <p:cNvSpPr>
             <a:spLocks noGrp="1" noChangeArrowheads="1"/>
           </p:cNvSpPr>
@@ -5685,7 +6969,7 @@
       </p:grpSpPr>
       <p:sp>
         <p:nvSpPr>
-          <p:cNvPr id="48130" name="AutoShape 2"/>
+          <p:cNvPr id="20481" name="AutoShape 2"/>
           <p:cNvSpPr>
             <a:spLocks noGrp="1" noChangeArrowheads="1"/>
           </p:cNvSpPr>
@@ -5713,7 +6997,7 @@
       </p:sp>
       <p:sp>
         <p:nvSpPr>
-          <p:cNvPr id="48131" name="Rectangle 3"/>
+          <p:cNvPr id="20482" name="Rectangle 3"/>
           <p:cNvSpPr>
             <a:spLocks noGrp="1" noChangeArrowheads="1"/>
           </p:cNvSpPr>
@@ -5810,7 +7094,7 @@
       </p:grpSpPr>
       <p:sp>
         <p:nvSpPr>
-          <p:cNvPr id="44034" name="Rectangle 2"/>
+          <p:cNvPr id="21505" name="Rectangle 2"/>
           <p:cNvSpPr>
             <a:spLocks noGrp="1" noChangeArrowheads="1"/>
           </p:cNvSpPr>
@@ -5818,18 +7102,27 @@
             <p:ph type="title"/>
           </p:nvPr>
         </p:nvSpPr>
-        <p:spPr/>
+        <p:spPr>
+          <a:xfrm>
+            <a:off x="762000" y="762000"/>
+            <a:ext cx="7924800" cy="609600"/>
+          </a:xfrm>
+        </p:spPr>
         <p:txBody>
           <a:bodyPr/>
           <a:lstStyle/>
           <a:p>
-            <a:endParaRPr lang="en-US" smtClean="0"/>
-          </a:p>
-        </p:txBody>
-      </p:sp>
-      <p:sp>
-        <p:nvSpPr>
-          <p:cNvPr id="44035" name="Rectangle 3"/>
+            <a:pPr algn="r"/>
+            <a:r>
+              <a:rPr lang="en-US" sz="2800" smtClean="0"/>
+              <a:t>Tiếp nhận dữ liệu từ InputStream – Text</a:t>
+            </a:r>
+          </a:p>
+        </p:txBody>
+      </p:sp>
+      <p:sp>
+        <p:nvSpPr>
+          <p:cNvPr id="21506" name="Rectangle 3"/>
           <p:cNvSpPr>
             <a:spLocks noGrp="1" noChangeArrowheads="1"/>
           </p:cNvSpPr>
@@ -5842,7 +7135,249 @@
           <a:bodyPr/>
           <a:lstStyle/>
           <a:p>
-            <a:endParaRPr lang="en-US" smtClean="0"/>
+            <a:pPr>
+              <a:lnSpc>
+                <a:spcPct val="80000"/>
+              </a:lnSpc>
+            </a:pPr>
+            <a:r>
+              <a:rPr lang="en-US" sz="2400" smtClean="0"/>
+              <a:t>Tiếp nhận dữ liệu dạng chuỗi “text/…”</a:t>
+            </a:r>
+          </a:p>
+          <a:p>
+            <a:pPr lvl="2">
+              <a:lnSpc>
+                <a:spcPct val="80000"/>
+              </a:lnSpc>
+              <a:buFont typeface="Wingdings" pitchFamily="2" charset="2"/>
+              <a:buNone/>
+            </a:pPr>
+            <a:endParaRPr lang="en-US" sz="1600" smtClean="0"/>
+          </a:p>
+          <a:p>
+            <a:pPr lvl="2">
+              <a:lnSpc>
+                <a:spcPct val="80000"/>
+              </a:lnSpc>
+              <a:buFont typeface="Wingdings" pitchFamily="2" charset="2"/>
+              <a:buNone/>
+            </a:pPr>
+            <a:r>
+              <a:rPr lang="en-US" sz="1600" smtClean="0"/>
+              <a:t>StringBuffer sb = </a:t>
+            </a:r>
+            <a:r>
+              <a:rPr lang="en-US" sz="1600" b="1" smtClean="0"/>
+              <a:t>new</a:t>
+            </a:r>
+            <a:r>
+              <a:rPr lang="en-US" sz="1600" smtClean="0"/>
+              <a:t> StringBuffer();</a:t>
+            </a:r>
+          </a:p>
+          <a:p>
+            <a:pPr lvl="2">
+              <a:lnSpc>
+                <a:spcPct val="80000"/>
+              </a:lnSpc>
+              <a:buFont typeface="Wingdings" pitchFamily="2" charset="2"/>
+              <a:buNone/>
+            </a:pPr>
+            <a:r>
+              <a:rPr lang="en-US" sz="1600" smtClean="0"/>
+              <a:t> String line = </a:t>
+            </a:r>
+            <a:r>
+              <a:rPr lang="en-US" sz="1600" b="1" smtClean="0"/>
+              <a:t>null</a:t>
+            </a:r>
+            <a:r>
+              <a:rPr lang="en-US" sz="1600" smtClean="0"/>
+              <a:t>;</a:t>
+            </a:r>
+          </a:p>
+          <a:p>
+            <a:pPr lvl="2">
+              <a:lnSpc>
+                <a:spcPct val="80000"/>
+              </a:lnSpc>
+              <a:buFont typeface="Wingdings" pitchFamily="2" charset="2"/>
+              <a:buNone/>
+            </a:pPr>
+            <a:r>
+              <a:rPr lang="en-US" sz="1600" smtClean="0"/>
+              <a:t> </a:t>
+            </a:r>
+            <a:r>
+              <a:rPr lang="en-US" sz="1600" b="1" smtClean="0"/>
+              <a:t>try</a:t>
+            </a:r>
+            <a:r>
+              <a:rPr lang="en-US" sz="1600" smtClean="0"/>
+              <a:t> {</a:t>
+            </a:r>
+          </a:p>
+          <a:p>
+            <a:pPr lvl="2">
+              <a:lnSpc>
+                <a:spcPct val="80000"/>
+              </a:lnSpc>
+              <a:buFont typeface="Wingdings" pitchFamily="2" charset="2"/>
+              <a:buNone/>
+            </a:pPr>
+            <a:r>
+              <a:rPr lang="en-US" sz="1600" smtClean="0"/>
+              <a:t>   InputStreamReader isr = </a:t>
+            </a:r>
+            <a:r>
+              <a:rPr lang="en-US" sz="1600" b="1" smtClean="0"/>
+              <a:t>new</a:t>
+            </a:r>
+            <a:r>
+              <a:rPr lang="en-US" sz="1600" smtClean="0"/>
+              <a:t> InputStreamReader( (InputStream)is );</a:t>
+            </a:r>
+          </a:p>
+          <a:p>
+            <a:pPr lvl="2">
+              <a:lnSpc>
+                <a:spcPct val="80000"/>
+              </a:lnSpc>
+              <a:buFont typeface="Wingdings" pitchFamily="2" charset="2"/>
+              <a:buNone/>
+            </a:pPr>
+            <a:r>
+              <a:rPr lang="en-US" sz="1600" smtClean="0"/>
+              <a:t>	    BufferedReader br = </a:t>
+            </a:r>
+            <a:r>
+              <a:rPr lang="en-US" sz="1600" b="1" smtClean="0"/>
+              <a:t>new</a:t>
+            </a:r>
+            <a:r>
+              <a:rPr lang="en-US" sz="1600" smtClean="0"/>
+              <a:t> BufferedReader(isr);</a:t>
+            </a:r>
+          </a:p>
+          <a:p>
+            <a:pPr lvl="3">
+              <a:lnSpc>
+                <a:spcPct val="80000"/>
+              </a:lnSpc>
+              <a:buFontTx/>
+              <a:buNone/>
+            </a:pPr>
+            <a:r>
+              <a:rPr lang="en-US" sz="1400" b="1" smtClean="0"/>
+              <a:t>while</a:t>
+            </a:r>
+            <a:r>
+              <a:rPr lang="en-US" sz="1400" smtClean="0"/>
+              <a:t>((line = br.readLine()) != </a:t>
+            </a:r>
+            <a:r>
+              <a:rPr lang="en-US" sz="1400" b="1" smtClean="0"/>
+              <a:t>null</a:t>
+            </a:r>
+            <a:r>
+              <a:rPr lang="en-US" sz="1400" smtClean="0"/>
+              <a:t>) {</a:t>
+            </a:r>
+          </a:p>
+          <a:p>
+            <a:pPr lvl="3">
+              <a:lnSpc>
+                <a:spcPct val="80000"/>
+              </a:lnSpc>
+              <a:buFontTx/>
+              <a:buNone/>
+            </a:pPr>
+            <a:r>
+              <a:rPr lang="en-US" sz="1400" smtClean="0"/>
+              <a:t>	   sb.append(line).append("\n");</a:t>
+            </a:r>
+          </a:p>
+          <a:p>
+            <a:pPr lvl="3">
+              <a:lnSpc>
+                <a:spcPct val="80000"/>
+              </a:lnSpc>
+              <a:buFontTx/>
+              <a:buNone/>
+            </a:pPr>
+            <a:r>
+              <a:rPr lang="en-US" sz="1400" smtClean="0"/>
+              <a:t>}</a:t>
+            </a:r>
+          </a:p>
+          <a:p>
+            <a:pPr lvl="2">
+              <a:lnSpc>
+                <a:spcPct val="80000"/>
+              </a:lnSpc>
+              <a:buFont typeface="Wingdings" pitchFamily="2" charset="2"/>
+              <a:buNone/>
+            </a:pPr>
+            <a:r>
+              <a:rPr lang="en-US" sz="1600" smtClean="0"/>
+              <a:t>} </a:t>
+            </a:r>
+            <a:r>
+              <a:rPr lang="en-US" sz="1600" b="1" smtClean="0"/>
+              <a:t>catch</a:t>
+            </a:r>
+            <a:r>
+              <a:rPr lang="en-US" sz="1600" smtClean="0"/>
+              <a:t> (IOException e) {</a:t>
+            </a:r>
+          </a:p>
+          <a:p>
+            <a:pPr lvl="2">
+              <a:lnSpc>
+                <a:spcPct val="80000"/>
+              </a:lnSpc>
+              <a:buFont typeface="Wingdings" pitchFamily="2" charset="2"/>
+              <a:buNone/>
+            </a:pPr>
+            <a:r>
+              <a:rPr lang="en-US" sz="1600" smtClean="0"/>
+              <a:t>	e.printStackTrace();</a:t>
+            </a:r>
+          </a:p>
+          <a:p>
+            <a:pPr lvl="2">
+              <a:lnSpc>
+                <a:spcPct val="80000"/>
+              </a:lnSpc>
+              <a:buFont typeface="Wingdings" pitchFamily="2" charset="2"/>
+              <a:buNone/>
+            </a:pPr>
+            <a:r>
+              <a:rPr lang="en-US" sz="1600" smtClean="0"/>
+              <a:t>}</a:t>
+            </a:r>
+          </a:p>
+          <a:p>
+            <a:pPr lvl="2">
+              <a:lnSpc>
+                <a:spcPct val="80000"/>
+              </a:lnSpc>
+              <a:buFont typeface="Wingdings" pitchFamily="2" charset="2"/>
+              <a:buNone/>
+            </a:pPr>
+            <a:r>
+              <a:rPr lang="en-US" sz="1600" smtClean="0"/>
+              <a:t>String </a:t>
+            </a:r>
+            <a:r>
+              <a:rPr lang="en-US" sz="1600" u="sng" smtClean="0"/>
+              <a:t>result</a:t>
+            </a:r>
+            <a:r>
+              <a:rPr lang="en-US" sz="1600" smtClean="0"/>
+              <a:t> = sb.toString();</a:t>
+            </a:r>
           </a:p>
         </p:txBody>
       </p:sp>
@@ -5873,7 +7408,7 @@
       </p:grpSpPr>
       <p:sp>
         <p:nvSpPr>
-          <p:cNvPr id="45058" name="Rectangle 2"/>
+          <p:cNvPr id="22529" name="Rectangle 2"/>
           <p:cNvSpPr>
             <a:spLocks noGrp="1" noChangeArrowheads="1"/>
           </p:cNvSpPr>
@@ -5881,18 +7416,27 @@
             <p:ph type="title"/>
           </p:nvPr>
         </p:nvSpPr>
-        <p:spPr/>
+        <p:spPr>
+          <a:xfrm>
+            <a:off x="762000" y="762000"/>
+            <a:ext cx="7924800" cy="609600"/>
+          </a:xfrm>
+        </p:spPr>
         <p:txBody>
           <a:bodyPr/>
           <a:lstStyle/>
           <a:p>
-            <a:endParaRPr lang="en-US" smtClean="0"/>
-          </a:p>
-        </p:txBody>
-      </p:sp>
-      <p:sp>
-        <p:nvSpPr>
-          <p:cNvPr id="45059" name="Rectangle 3"/>
+            <a:pPr algn="r"/>
+            <a:r>
+              <a:rPr lang="en-US" sz="2800" smtClean="0"/>
+              <a:t>Tiếp nhận dữ liệu từ InputStream – Bitmap</a:t>
+            </a:r>
+          </a:p>
+        </p:txBody>
+      </p:sp>
+      <p:sp>
+        <p:nvSpPr>
+          <p:cNvPr id="22530" name="Rectangle 3"/>
           <p:cNvSpPr>
             <a:spLocks noGrp="1" noChangeArrowheads="1"/>
           </p:cNvSpPr>
@@ -5905,7 +7449,62 @@
           <a:bodyPr/>
           <a:lstStyle/>
           <a:p>
-            <a:endParaRPr lang="en-US" smtClean="0"/>
+            <a:r>
+              <a:rPr lang="en-US" smtClean="0"/>
+              <a:t>Tiếp nhận dữ liệu dạng “image/..”</a:t>
+            </a:r>
+          </a:p>
+          <a:p>
+            <a:pPr lvl="1"/>
+            <a:r>
+              <a:rPr lang="en-US" sz="1600" smtClean="0"/>
+              <a:t>BitmapDrawable abd = </a:t>
+            </a:r>
+            <a:r>
+              <a:rPr lang="en-US" sz="1600" b="1" smtClean="0"/>
+              <a:t>new</a:t>
+            </a:r>
+            <a:r>
+              <a:rPr lang="en-US" sz="1600" smtClean="0"/>
+              <a:t> BitmapDrawable( (InputStream)is );</a:t>
+            </a:r>
+          </a:p>
+          <a:p>
+            <a:pPr lvl="1">
+              <a:buFontTx/>
+              <a:buNone/>
+            </a:pPr>
+            <a:r>
+              <a:rPr lang="en-US" sz="1600" smtClean="0"/>
+              <a:t>	Bitmap </a:t>
+            </a:r>
+            <a:r>
+              <a:rPr lang="en-US" sz="1600" u="sng" smtClean="0"/>
+              <a:t>bitmap</a:t>
+            </a:r>
+            <a:r>
+              <a:rPr lang="en-US" sz="1600" smtClean="0"/>
+              <a:t> = abd.getBitmap();</a:t>
+            </a:r>
+          </a:p>
+          <a:p>
+            <a:pPr lvl="1"/>
+            <a:endParaRPr lang="en-US" sz="1600" smtClean="0"/>
+          </a:p>
+          <a:p>
+            <a:pPr lvl="1"/>
+            <a:r>
+              <a:rPr lang="en-US" sz="1600" smtClean="0"/>
+              <a:t>Bitmap bitmap = BitmapFactory.decodeStream(is</a:t>
+            </a:r>
+            <a:r>
+              <a:rPr lang="en-US" sz="1600" u="sng" smtClean="0"/>
+              <a:t>)</a:t>
+            </a:r>
+            <a:r>
+              <a:rPr lang="en-US" sz="1600" smtClean="0"/>
+              <a:t>;</a:t>
+            </a:r>
           </a:p>
         </p:txBody>
       </p:sp>
@@ -5936,7 +7535,7 @@
       </p:grpSpPr>
       <p:sp>
         <p:nvSpPr>
-          <p:cNvPr id="46082" name="Rectangle 2"/>
+          <p:cNvPr id="23553" name="Rectangle 2"/>
           <p:cNvSpPr>
             <a:spLocks noGrp="1" noChangeArrowheads="1"/>
           </p:cNvSpPr>
@@ -5944,18 +7543,27 @@
             <p:ph type="title"/>
           </p:nvPr>
         </p:nvSpPr>
-        <p:spPr/>
+        <p:spPr>
+          <a:xfrm>
+            <a:off x="762000" y="762000"/>
+            <a:ext cx="7924800" cy="685800"/>
+          </a:xfrm>
+        </p:spPr>
         <p:txBody>
           <a:bodyPr/>
           <a:lstStyle/>
           <a:p>
-            <a:endParaRPr lang="en-US" smtClean="0"/>
-          </a:p>
-        </p:txBody>
-      </p:sp>
-      <p:sp>
-        <p:nvSpPr>
-          <p:cNvPr id="46083" name="Rectangle 3"/>
+            <a:pPr algn="r"/>
+            <a:r>
+              <a:rPr lang="en-US" sz="2800" smtClean="0"/>
+              <a:t>Tiếp nhận dữ liệu từ InputStream – byte[]</a:t>
+            </a:r>
+          </a:p>
+        </p:txBody>
+      </p:sp>
+      <p:sp>
+        <p:nvSpPr>
+          <p:cNvPr id="23554" name="Rectangle 3"/>
           <p:cNvSpPr>
             <a:spLocks noGrp="1" noChangeArrowheads="1"/>
           </p:cNvSpPr>
@@ -5963,12 +7571,258 @@
             <p:ph type="body" idx="1"/>
           </p:nvPr>
         </p:nvSpPr>
-        <p:spPr/>
+        <p:spPr>
+          <a:xfrm>
+            <a:off x="838200" y="2362200"/>
+            <a:ext cx="7693025" cy="4191000"/>
+          </a:xfrm>
+        </p:spPr>
         <p:txBody>
           <a:bodyPr/>
           <a:lstStyle/>
           <a:p>
-            <a:endParaRPr lang="en-US" smtClean="0"/>
+            <a:pPr>
+              <a:lnSpc>
+                <a:spcPct val="80000"/>
+              </a:lnSpc>
+            </a:pPr>
+            <a:r>
+              <a:rPr lang="en-US" smtClean="0"/>
+              <a:t>Tiếp nhận dữ liệu từ InputStream thành kiểu mảng bytes: </a:t>
+            </a:r>
+          </a:p>
+          <a:p>
+            <a:pPr lvl="2">
+              <a:lnSpc>
+                <a:spcPct val="80000"/>
+              </a:lnSpc>
+              <a:buFont typeface="Wingdings" pitchFamily="2" charset="2"/>
+              <a:buNone/>
+            </a:pPr>
+            <a:r>
+              <a:rPr lang="en-US" sz="1800" smtClean="0"/>
+              <a:t>HttpClient httpclient = (HttpClient) </a:t>
+            </a:r>
+            <a:r>
+              <a:rPr lang="en-US" sz="1800" b="1" smtClean="0"/>
+              <a:t>new</a:t>
+            </a:r>
+            <a:r>
+              <a:rPr lang="en-US" sz="1800" smtClean="0"/>
+              <a:t> DefaultHttpClient();</a:t>
+            </a:r>
+          </a:p>
+          <a:p>
+            <a:pPr lvl="2">
+              <a:lnSpc>
+                <a:spcPct val="80000"/>
+              </a:lnSpc>
+              <a:buFont typeface="Wingdings" pitchFamily="2" charset="2"/>
+              <a:buNone/>
+            </a:pPr>
+            <a:r>
+              <a:rPr lang="en-US" sz="1800" smtClean="0"/>
+              <a:t>HttpGet getobj = </a:t>
+            </a:r>
+            <a:r>
+              <a:rPr lang="en-US" sz="1800" b="1" smtClean="0"/>
+              <a:t>new</a:t>
+            </a:r>
+            <a:r>
+              <a:rPr lang="en-US" sz="1800" smtClean="0"/>
+              <a:t> HttpGet(strURL);</a:t>
+            </a:r>
+          </a:p>
+          <a:p>
+            <a:pPr lvl="2">
+              <a:lnSpc>
+                <a:spcPct val="80000"/>
+              </a:lnSpc>
+              <a:buFont typeface="Wingdings" pitchFamily="2" charset="2"/>
+              <a:buNone/>
+            </a:pPr>
+            <a:r>
+              <a:rPr lang="en-US" sz="1800" smtClean="0"/>
+              <a:t>HttpResponse response;</a:t>
+            </a:r>
+          </a:p>
+          <a:p>
+            <a:pPr lvl="2">
+              <a:lnSpc>
+                <a:spcPct val="80000"/>
+              </a:lnSpc>
+              <a:buFont typeface="Wingdings" pitchFamily="2" charset="2"/>
+              <a:buNone/>
+            </a:pPr>
+            <a:r>
+              <a:rPr lang="en-US" sz="1800" smtClean="0"/>
+              <a:t>response = httpclient.execute(getobj);</a:t>
+            </a:r>
+          </a:p>
+          <a:p>
+            <a:pPr lvl="2">
+              <a:lnSpc>
+                <a:spcPct val="80000"/>
+              </a:lnSpc>
+              <a:buFont typeface="Wingdings" pitchFamily="2" charset="2"/>
+              <a:buNone/>
+            </a:pPr>
+            <a:r>
+              <a:rPr lang="en-US" sz="1800" b="1" smtClean="0"/>
+              <a:t>if</a:t>
+            </a:r>
+            <a:r>
+              <a:rPr lang="en-US" sz="1800" smtClean="0"/>
+              <a:t> (response.getStatusLine().getStatusCode() == 200) {</a:t>
+            </a:r>
+          </a:p>
+          <a:p>
+            <a:pPr lvl="3">
+              <a:lnSpc>
+                <a:spcPct val="80000"/>
+              </a:lnSpc>
+              <a:buFontTx/>
+              <a:buNone/>
+            </a:pPr>
+            <a:r>
+              <a:rPr lang="en-US" sz="1600" smtClean="0"/>
+              <a:t>HttpEntity anEntity = response.getEntity(); </a:t>
+            </a:r>
+          </a:p>
+          <a:p>
+            <a:pPr lvl="3">
+              <a:lnSpc>
+                <a:spcPct val="80000"/>
+              </a:lnSpc>
+              <a:buFontTx/>
+              <a:buNone/>
+            </a:pPr>
+            <a:r>
+              <a:rPr lang="en-US" sz="1600" smtClean="0"/>
+              <a:t>InputStream in = anEntity.getContent();</a:t>
+            </a:r>
+          </a:p>
+          <a:p>
+            <a:pPr lvl="3">
+              <a:lnSpc>
+                <a:spcPct val="80000"/>
+              </a:lnSpc>
+              <a:buFontTx/>
+              <a:buNone/>
+            </a:pPr>
+            <a:r>
+              <a:rPr lang="en-US" sz="1600" b="1" smtClean="0"/>
+              <a:t>int</a:t>
+            </a:r>
+            <a:r>
+              <a:rPr lang="en-US" sz="1600" smtClean="0"/>
+              <a:t>  bytesLength = (</a:t>
+            </a:r>
+            <a:r>
+              <a:rPr lang="en-US" sz="1600" b="1" smtClean="0"/>
+              <a:t>int</a:t>
+            </a:r>
+            <a:r>
+              <a:rPr lang="en-US" sz="1600" smtClean="0"/>
+              <a:t>) anEntity.getContentLength();</a:t>
+            </a:r>
+          </a:p>
+          <a:p>
+            <a:pPr lvl="3">
+              <a:lnSpc>
+                <a:spcPct val="80000"/>
+              </a:lnSpc>
+              <a:buFontTx/>
+              <a:buNone/>
+            </a:pPr>
+            <a:r>
+              <a:rPr lang="en-US" sz="1600" b="1" smtClean="0"/>
+              <a:t>byte</a:t>
+            </a:r>
+            <a:r>
+              <a:rPr lang="en-US" sz="1600" smtClean="0"/>
+              <a:t>[] arBytes = </a:t>
+            </a:r>
+            <a:r>
+              <a:rPr lang="en-US" sz="1600" b="1" smtClean="0"/>
+              <a:t>new</a:t>
+            </a:r>
+            <a:r>
+              <a:rPr lang="en-US" sz="1600" smtClean="0"/>
+              <a:t> </a:t>
+            </a:r>
+            <a:r>
+              <a:rPr lang="en-US" sz="1600" b="1" smtClean="0"/>
+              <a:t>byte</a:t>
+            </a:r>
+            <a:r>
+              <a:rPr lang="en-US" sz="1600" smtClean="0"/>
+              <a:t>[bytesLength];</a:t>
+            </a:r>
+          </a:p>
+          <a:p>
+            <a:pPr lvl="3">
+              <a:lnSpc>
+                <a:spcPct val="80000"/>
+              </a:lnSpc>
+              <a:buFontTx/>
+              <a:buNone/>
+            </a:pPr>
+            <a:r>
+              <a:rPr lang="en-US" sz="1600" smtClean="0"/>
+              <a:t>BufferedInputStream bis = </a:t>
+            </a:r>
+            <a:r>
+              <a:rPr lang="en-US" sz="1600" b="1" smtClean="0"/>
+              <a:t>new</a:t>
+            </a:r>
+            <a:r>
+              <a:rPr lang="en-US" sz="1600" smtClean="0"/>
+              <a:t> BufferedInputStream(in);</a:t>
+            </a:r>
+          </a:p>
+          <a:p>
+            <a:pPr lvl="3">
+              <a:lnSpc>
+                <a:spcPct val="80000"/>
+              </a:lnSpc>
+              <a:buFontTx/>
+              <a:buNone/>
+            </a:pPr>
+            <a:r>
+              <a:rPr lang="en-US" sz="1600" smtClean="0">
+                <a:solidFill>
+                  <a:srgbClr val="CC0000"/>
+                </a:solidFill>
+              </a:rPr>
+              <a:t>bis.read(arBytes, 0, bytesLength);</a:t>
+            </a:r>
+          </a:p>
+          <a:p>
+            <a:pPr lvl="3">
+              <a:lnSpc>
+                <a:spcPct val="80000"/>
+              </a:lnSpc>
+              <a:buFontTx/>
+              <a:buNone/>
+            </a:pPr>
+            <a:r>
+              <a:rPr lang="en-US" sz="1600" smtClean="0"/>
+              <a:t>//..</a:t>
+            </a:r>
+          </a:p>
+          <a:p>
+            <a:pPr lvl="2">
+              <a:lnSpc>
+                <a:spcPct val="80000"/>
+              </a:lnSpc>
+              <a:buFont typeface="Wingdings" pitchFamily="2" charset="2"/>
+              <a:buNone/>
+            </a:pPr>
+            <a:r>
+              <a:rPr lang="en-US" sz="1800" smtClean="0"/>
+              <a:t>}</a:t>
+            </a:r>
           </a:p>
         </p:txBody>
       </p:sp>
@@ -5999,7 +7853,7 @@
       </p:grpSpPr>
       <p:sp>
         <p:nvSpPr>
-          <p:cNvPr id="47106" name="Rectangle 2"/>
+          <p:cNvPr id="27650" name="AutoShape 2"/>
           <p:cNvSpPr>
             <a:spLocks noGrp="1" noChangeArrowheads="1"/>
           </p:cNvSpPr>
@@ -6007,18 +7861,27 @@
             <p:ph type="title"/>
           </p:nvPr>
         </p:nvSpPr>
-        <p:spPr/>
+        <p:spPr>
+          <a:xfrm>
+            <a:off x="762000" y="762000"/>
+            <a:ext cx="7924800" cy="533400"/>
+          </a:xfrm>
+        </p:spPr>
         <p:txBody>
           <a:bodyPr/>
           <a:lstStyle/>
           <a:p>
-            <a:endParaRPr lang="en-US" smtClean="0"/>
-          </a:p>
-        </p:txBody>
-      </p:sp>
-      <p:sp>
-        <p:nvSpPr>
-          <p:cNvPr id="47107" name="Rectangle 3"/>
+            <a:pPr algn="r"/>
+            <a:r>
+              <a:rPr lang="en-US" sz="3200" smtClean="0"/>
+              <a:t>Xử lý với dữ liệu “text/xml”</a:t>
+            </a:r>
+          </a:p>
+        </p:txBody>
+      </p:sp>
+      <p:sp>
+        <p:nvSpPr>
+          <p:cNvPr id="27651" name="Rectangle 3"/>
           <p:cNvSpPr>
             <a:spLocks noGrp="1" noChangeArrowheads="1"/>
           </p:cNvSpPr>
@@ -6031,7 +7894,181 @@
           <a:bodyPr/>
           <a:lstStyle/>
           <a:p>
-            <a:endParaRPr lang="en-US" smtClean="0"/>
+            <a:pPr>
+              <a:lnSpc>
+                <a:spcPct val="80000"/>
+              </a:lnSpc>
+            </a:pPr>
+            <a:r>
+              <a:rPr lang="en-US" sz="1600" smtClean="0"/>
+              <a:t>XML = eXtensible Markup Language</a:t>
+            </a:r>
+          </a:p>
+          <a:p>
+            <a:pPr lvl="1">
+              <a:lnSpc>
+                <a:spcPct val="80000"/>
+              </a:lnSpc>
+              <a:buFontTx/>
+              <a:buNone/>
+            </a:pPr>
+            <a:r>
+              <a:rPr lang="en-US" sz="1400" smtClean="0"/>
+              <a:t>&lt;?xml version="1.0"?&gt;</a:t>
+            </a:r>
+          </a:p>
+          <a:p>
+            <a:pPr lvl="1">
+              <a:lnSpc>
+                <a:spcPct val="80000"/>
+              </a:lnSpc>
+              <a:buFontTx/>
+              <a:buNone/>
+            </a:pPr>
+            <a:r>
+              <a:rPr lang="en-US" sz="1400" smtClean="0"/>
+              <a:t>	&lt;feed xmlns="http://www.w3.org/2005/Atom" xmlns:georss="http://www.georss.org/georss"&gt;</a:t>
+            </a:r>
+          </a:p>
+          <a:p>
+            <a:pPr lvl="1">
+              <a:lnSpc>
+                <a:spcPct val="80000"/>
+              </a:lnSpc>
+              <a:buFontTx/>
+              <a:buNone/>
+            </a:pPr>
+            <a:r>
+              <a:rPr lang="en-US" sz="1400" smtClean="0"/>
+              <a:t>  	&lt;updated&gt;2011-11-04T08:12:13Z&lt;/updated&gt;</a:t>
+            </a:r>
+          </a:p>
+          <a:p>
+            <a:pPr lvl="1">
+              <a:lnSpc>
+                <a:spcPct val="80000"/>
+              </a:lnSpc>
+              <a:buFontTx/>
+              <a:buNone/>
+            </a:pPr>
+            <a:r>
+              <a:rPr lang="en-US" sz="1400" smtClean="0"/>
+              <a:t>  	&lt;title&gt;USGS M 2.5+ Earthquakes&lt;/title&gt;</a:t>
+            </a:r>
+          </a:p>
+          <a:p>
+            <a:pPr lvl="1">
+              <a:lnSpc>
+                <a:spcPct val="80000"/>
+              </a:lnSpc>
+              <a:buFontTx/>
+              <a:buNone/>
+            </a:pPr>
+            <a:r>
+              <a:rPr lang="en-US" sz="1400" smtClean="0"/>
+              <a:t>  	&lt;subtitle&gt;Real-time, worldwide earthquake list for the past day&lt;/subtitle&gt;</a:t>
+            </a:r>
+          </a:p>
+          <a:p>
+            <a:pPr lvl="1">
+              <a:lnSpc>
+                <a:spcPct val="80000"/>
+              </a:lnSpc>
+              <a:buFontTx/>
+              <a:buNone/>
+            </a:pPr>
+            <a:r>
+              <a:rPr lang="en-US" sz="1400" smtClean="0"/>
+              <a:t>  	&lt;link rel="self" href="http://earthquake.usgs.gov/earthquakes/catalogs/1day-M2.5.xml"/&gt;</a:t>
+            </a:r>
+          </a:p>
+          <a:p>
+            <a:pPr lvl="1">
+              <a:lnSpc>
+                <a:spcPct val="80000"/>
+              </a:lnSpc>
+              <a:buFontTx/>
+              <a:buNone/>
+            </a:pPr>
+            <a:r>
+              <a:rPr lang="en-US" sz="1400" smtClean="0"/>
+              <a:t>  	&lt;link href="http://earthquake.usgs.gov/earthquakes/"/&gt;</a:t>
+            </a:r>
+          </a:p>
+          <a:p>
+            <a:pPr lvl="1">
+              <a:lnSpc>
+                <a:spcPct val="80000"/>
+              </a:lnSpc>
+              <a:buFontTx/>
+              <a:buNone/>
+            </a:pPr>
+            <a:r>
+              <a:rPr lang="en-US" sz="1400" smtClean="0"/>
+              <a:t>  	&lt;author&gt;&lt;name&gt;U.S. Geological Survey&lt;/name&gt;&lt;/author&gt;</a:t>
+            </a:r>
+          </a:p>
+          <a:p>
+            <a:pPr lvl="1">
+              <a:lnSpc>
+                <a:spcPct val="80000"/>
+              </a:lnSpc>
+              <a:buFontTx/>
+              <a:buNone/>
+            </a:pPr>
+            <a:endParaRPr lang="en-US" sz="1400" smtClean="0"/>
+          </a:p>
+          <a:p>
+            <a:pPr lvl="1">
+              <a:lnSpc>
+                <a:spcPct val="80000"/>
+              </a:lnSpc>
+              <a:buFontTx/>
+              <a:buNone/>
+            </a:pPr>
+            <a:r>
+              <a:rPr lang="en-US" sz="1400" smtClean="0"/>
+              <a:t>  	&lt;entry&gt;&lt;id&gt;b0006iti&lt;/id&gt;&lt;title&gt;M 4.9, Hindu Kush region, Afghanistan&lt;/title&gt;&lt;/entry&gt;</a:t>
+            </a:r>
+          </a:p>
+          <a:p>
+            <a:pPr lvl="1">
+              <a:lnSpc>
+                <a:spcPct val="80000"/>
+              </a:lnSpc>
+              <a:buFontTx/>
+              <a:buNone/>
+            </a:pPr>
+            <a:r>
+              <a:rPr lang="en-US" sz="1400" smtClean="0"/>
+              <a:t> 	 &lt;entry&gt;&lt;id&gt;10348204&lt;/id&gt;&lt;title&gt;M 2.6, Kenai Peninsula, Alaska&lt;/title&gt;&lt;&lt;/entry&gt;</a:t>
+            </a:r>
+          </a:p>
+          <a:p>
+            <a:pPr lvl="1">
+              <a:lnSpc>
+                <a:spcPct val="80000"/>
+              </a:lnSpc>
+              <a:buFontTx/>
+              <a:buNone/>
+            </a:pPr>
+            <a:r>
+              <a:rPr lang="en-US" sz="1400" smtClean="0"/>
+              <a:t>  	&lt;entry&gt;&lt;id&gt;b0006irn&lt;/id&gt;&lt;title&gt;M 5.1, near the south coast of Honshu, Japan&lt;/title&gt;&lt;/entry&gt;</a:t>
+            </a:r>
+          </a:p>
+          <a:p>
+            <a:pPr lvl="1">
+              <a:lnSpc>
+                <a:spcPct val="80000"/>
+              </a:lnSpc>
+              <a:buFontTx/>
+              <a:buNone/>
+            </a:pPr>
+            <a:r>
+              <a:rPr lang="en-US" sz="1400" smtClean="0"/>
+              <a:t>&lt;/feed&gt;</a:t>
+            </a:r>
           </a:p>
         </p:txBody>
       </p:sp>

</xml_diff>